<commit_message>
Updated presentations for labs 01_Introduction and 02_Design.
</commit_message>
<xml_diff>
--- a/02_Design/PV239-Xamarin-02_Design.pptx
+++ b/02_Design/PV239-Xamarin-02_Design.pptx
@@ -5,7 +5,7 @@
     <p:sldMasterId id="2147483700" r:id="rId1"/>
   </p:sldMasterIdLst>
   <p:notesMasterIdLst>
-    <p:notesMasterId r:id="rId30"/>
+    <p:notesMasterId r:id="rId19"/>
   </p:notesMasterIdLst>
   <p:sldIdLst>
     <p:sldId id="256" r:id="rId2"/>
@@ -17,25 +17,14 @@
     <p:sldId id="306" r:id="rId8"/>
     <p:sldId id="305" r:id="rId9"/>
     <p:sldId id="351" r:id="rId10"/>
-    <p:sldId id="272" r:id="rId11"/>
+    <p:sldId id="364" r:id="rId11"/>
     <p:sldId id="356" r:id="rId12"/>
-    <p:sldId id="281" r:id="rId13"/>
-    <p:sldId id="348" r:id="rId14"/>
-    <p:sldId id="270" r:id="rId15"/>
-    <p:sldId id="349" r:id="rId16"/>
-    <p:sldId id="350" r:id="rId17"/>
-    <p:sldId id="280" r:id="rId18"/>
-    <p:sldId id="273" r:id="rId19"/>
-    <p:sldId id="344" r:id="rId20"/>
-    <p:sldId id="345" r:id="rId21"/>
-    <p:sldId id="346" r:id="rId22"/>
-    <p:sldId id="293" r:id="rId23"/>
-    <p:sldId id="352" r:id="rId24"/>
-    <p:sldId id="357" r:id="rId25"/>
-    <p:sldId id="358" r:id="rId26"/>
-    <p:sldId id="359" r:id="rId27"/>
-    <p:sldId id="360" r:id="rId28"/>
-    <p:sldId id="361" r:id="rId29"/>
+    <p:sldId id="352" r:id="rId13"/>
+    <p:sldId id="357" r:id="rId14"/>
+    <p:sldId id="358" r:id="rId15"/>
+    <p:sldId id="359" r:id="rId16"/>
+    <p:sldId id="360" r:id="rId17"/>
+    <p:sldId id="361" r:id="rId18"/>
   </p:sldIdLst>
   <p:sldSz cx="12192000" cy="6858000"/>
   <p:notesSz cx="6858000" cy="9144000"/>
@@ -136,7 +125,18 @@
   </p:defaultTextStyle>
   <p:extLst>
     <p:ext uri="{EFAFB233-063F-42B5-8137-9DF3F51BA10A}">
-      <p15:sldGuideLst xmlns:p15="http://schemas.microsoft.com/office/powerpoint/2012/main"/>
+      <p15:sldGuideLst xmlns:p15="http://schemas.microsoft.com/office/powerpoint/2012/main">
+        <p15:guide id="1" orient="horz" pos="2160" userDrawn="1">
+          <p15:clr>
+            <a:srgbClr val="A4A3A4"/>
+          </p15:clr>
+        </p15:guide>
+        <p15:guide id="2" pos="3840" userDrawn="1">
+          <p15:clr>
+            <a:srgbClr val="A4A3A4"/>
+          </p15:clr>
+        </p15:guide>
+      </p15:sldGuideLst>
     </p:ext>
   </p:extLst>
 </p:presentation>
@@ -224,7 +224,7 @@
           <a:p>
             <a:fld id="{48A795E8-66B5-4696-B483-F1F9FA0B53D4}" type="datetimeFigureOut">
               <a:rPr lang="cs-CZ" smtClean="0"/>
-              <a:t>01.03.2019</a:t>
+              <a:t>11.01.2020</a:t>
             </a:fld>
             <a:endParaRPr lang="cs-CZ"/>
           </a:p>
@@ -642,106 +642,6 @@
 </p:notes>
 </file>
 
-<file path=ppt/notesSlides/notesSlide2.xml><?xml version="1.0" encoding="utf-8"?>
-<p:notes xmlns:a="http://schemas.openxmlformats.org/drawingml/2006/main" xmlns:r="http://schemas.openxmlformats.org/officeDocument/2006/relationships" xmlns:p="http://schemas.openxmlformats.org/presentationml/2006/main">
-  <p:cSld>
-    <p:spTree>
-      <p:nvGrpSpPr>
-        <p:cNvPr id="1" name=""/>
-        <p:cNvGrpSpPr/>
-        <p:nvPr/>
-      </p:nvGrpSpPr>
-      <p:grpSpPr>
-        <a:xfrm>
-          <a:off x="0" y="0"/>
-          <a:ext cx="0" cy="0"/>
-          <a:chOff x="0" y="0"/>
-          <a:chExt cx="0" cy="0"/>
-        </a:xfrm>
-      </p:grpSpPr>
-      <p:sp>
-        <p:nvSpPr>
-          <p:cNvPr id="2" name="Slide Image Placeholder 1"/>
-          <p:cNvSpPr>
-            <a:spLocks noGrp="1" noRot="1" noChangeAspect="1"/>
-          </p:cNvSpPr>
-          <p:nvPr>
-            <p:ph type="sldImg"/>
-          </p:nvPr>
-        </p:nvSpPr>
-        <p:spPr/>
-      </p:sp>
-      <p:sp>
-        <p:nvSpPr>
-          <p:cNvPr id="3" name="Notes Placeholder 2"/>
-          <p:cNvSpPr>
-            <a:spLocks noGrp="1"/>
-          </p:cNvSpPr>
-          <p:nvPr>
-            <p:ph type="body" idx="1"/>
-          </p:nvPr>
-        </p:nvSpPr>
-        <p:spPr/>
-        <p:txBody>
-          <a:bodyPr/>
-          <a:lstStyle/>
-          <a:p>
-            <a:r>
-              <a:rPr lang="en-US" dirty="0"/>
-              <a:t>Inside of a page</a:t>
-            </a:r>
-            <a:r>
-              <a:rPr lang="en-US" baseline="0" dirty="0"/>
-              <a:t> are layouts</a:t>
-            </a:r>
-          </a:p>
-          <a:p>
-            <a:r>
-              <a:rPr lang="en-US" baseline="0" dirty="0"/>
-              <a:t>A lot of options from something simple like a stack panel to complex and powerful grids</a:t>
-            </a:r>
-          </a:p>
-          <a:p>
-            <a:endParaRPr lang="en-US" dirty="0"/>
-          </a:p>
-        </p:txBody>
-      </p:sp>
-      <p:sp>
-        <p:nvSpPr>
-          <p:cNvPr id="4" name="Slide Number Placeholder 3"/>
-          <p:cNvSpPr>
-            <a:spLocks noGrp="1"/>
-          </p:cNvSpPr>
-          <p:nvPr>
-            <p:ph type="sldNum" sz="quarter" idx="10"/>
-          </p:nvPr>
-        </p:nvSpPr>
-        <p:spPr/>
-        <p:txBody>
-          <a:bodyPr/>
-          <a:lstStyle/>
-          <a:p>
-            <a:fld id="{9A022845-941E-7C42-8070-12AD873FCE1E}" type="slidenum">
-              <a:rPr lang="en-US" smtClean="0"/>
-              <a:t>22</a:t>
-            </a:fld>
-            <a:endParaRPr lang="en-US"/>
-          </a:p>
-        </p:txBody>
-      </p:sp>
-    </p:spTree>
-    <p:extLst>
-      <p:ext uri="{BB962C8B-B14F-4D97-AF65-F5344CB8AC3E}">
-        <p14:creationId xmlns:p14="http://schemas.microsoft.com/office/powerpoint/2010/main" val="3887648242"/>
-      </p:ext>
-    </p:extLst>
-  </p:cSld>
-  <p:clrMapOvr>
-    <a:masterClrMapping/>
-  </p:clrMapOvr>
-</p:notes>
-</file>
-
 <file path=ppt/slideLayouts/slideLayout1.xml><?xml version="1.0" encoding="utf-8"?>
 <p:sldLayout xmlns:a="http://schemas.openxmlformats.org/drawingml/2006/main" xmlns:r="http://schemas.openxmlformats.org/officeDocument/2006/relationships" xmlns:p="http://schemas.openxmlformats.org/presentationml/2006/main" showMasterSp="0" type="title" preserve="1">
   <p:cSld name="Title Slide">
@@ -9535,7 +9435,7 @@
           <a:p>
             <a:fld id="{4AAD347D-5ACD-4C99-B74B-A9C85AD731AF}" type="datetimeFigureOut">
               <a:rPr lang="en-US" smtClean="0"/>
-              <a:t>2019-03-01</a:t>
+              <a:t>1/11/2020</a:t>
             </a:fld>
             <a:endParaRPr lang="en-US" dirty="0"/>
           </a:p>
@@ -9742,7 +9642,7 @@
           <a:p>
             <a:fld id="{4509A250-FF31-4206-8172-F9D3106AACB1}" type="datetimeFigureOut">
               <a:rPr lang="en-US" smtClean="0"/>
-              <a:t>2019-03-01</a:t>
+              <a:t>1/11/2020</a:t>
             </a:fld>
             <a:endParaRPr lang="en-US" dirty="0"/>
           </a:p>
@@ -9922,7 +9822,7 @@
           <a:p>
             <a:fld id="{4509A250-FF31-4206-8172-F9D3106AACB1}" type="datetimeFigureOut">
               <a:rPr lang="en-US" smtClean="0"/>
-              <a:t>2019-03-01</a:t>
+              <a:t>1/11/2020</a:t>
             </a:fld>
             <a:endParaRPr lang="en-US" dirty="0"/>
           </a:p>
@@ -10015,47 +9915,6 @@
   <p:clrMapOvr>
     <a:masterClrMapping/>
   </p:clrMapOvr>
-</p:sldLayout>
-</file>
-
-<file path=ppt/slideLayouts/slideLayout12.xml><?xml version="1.0" encoding="utf-8"?>
-<p:sldLayout xmlns:a="http://schemas.openxmlformats.org/drawingml/2006/main" xmlns:r="http://schemas.openxmlformats.org/officeDocument/2006/relationships" xmlns:p="http://schemas.openxmlformats.org/presentationml/2006/main" userDrawn="1">
-  <p:cSld name="Blank Dark">
-    <p:bg>
-      <p:bgPr>
-        <a:solidFill>
-          <a:schemeClr val="tx2"/>
-        </a:solidFill>
-        <a:effectLst/>
-      </p:bgPr>
-    </p:bg>
-    <p:spTree>
-      <p:nvGrpSpPr>
-        <p:cNvPr id="1" name=""/>
-        <p:cNvGrpSpPr/>
-        <p:nvPr/>
-      </p:nvGrpSpPr>
-      <p:grpSpPr>
-        <a:xfrm>
-          <a:off x="0" y="0"/>
-          <a:ext cx="0" cy="0"/>
-          <a:chOff x="0" y="0"/>
-          <a:chExt cx="0" cy="0"/>
-        </a:xfrm>
-      </p:grpSpPr>
-    </p:spTree>
-    <p:extLst>
-      <p:ext uri="{BB962C8B-B14F-4D97-AF65-F5344CB8AC3E}">
-        <p14:creationId xmlns:p14="http://schemas.microsoft.com/office/powerpoint/2010/main" val="426412785"/>
-      </p:ext>
-    </p:extLst>
-  </p:cSld>
-  <p:clrMapOvr>
-    <a:overrideClrMapping bg1="lt1" tx1="dk1" bg2="lt2" tx2="dk2" accent1="accent1" accent2="accent2" accent3="accent3" accent4="accent4" accent5="accent5" accent6="accent6" hlink="hlink" folHlink="folHlink"/>
-  </p:clrMapOvr>
-  <p:transition spd="slow">
-    <p:push/>
-  </p:transition>
 </p:sldLayout>
 </file>
 
@@ -10168,7 +10027,7 @@
           <a:p>
             <a:fld id="{4509A250-FF31-4206-8172-F9D3106AACB1}" type="datetimeFigureOut">
               <a:rPr lang="en-US" smtClean="0"/>
-              <a:t>2019-03-01</a:t>
+              <a:t>1/11/2020</a:t>
             </a:fld>
             <a:endParaRPr lang="en-US" dirty="0"/>
           </a:p>
@@ -19066,7 +18925,7 @@
           <a:p>
             <a:fld id="{9796027F-7875-4030-9381-8BD8C4F21935}" type="datetimeFigureOut">
               <a:rPr lang="en-US" smtClean="0"/>
-              <a:t>2019-03-01</a:t>
+              <a:t>1/11/2020</a:t>
             </a:fld>
             <a:endParaRPr lang="en-US" dirty="0"/>
           </a:p>
@@ -19340,7 +19199,7 @@
           <a:p>
             <a:fld id="{9796027F-7875-4030-9381-8BD8C4F21935}" type="datetimeFigureOut">
               <a:rPr lang="en-US" smtClean="0"/>
-              <a:t>2019-03-01</a:t>
+              <a:t>1/11/2020</a:t>
             </a:fld>
             <a:endParaRPr lang="en-US" dirty="0"/>
           </a:p>
@@ -19738,7 +19597,7 @@
           <a:p>
             <a:fld id="{9796027F-7875-4030-9381-8BD8C4F21935}" type="datetimeFigureOut">
               <a:rPr lang="en-US" smtClean="0"/>
-              <a:t>2019-03-01</a:t>
+              <a:t>1/11/2020</a:t>
             </a:fld>
             <a:endParaRPr lang="en-US" dirty="0"/>
           </a:p>
@@ -19856,7 +19715,7 @@
           <a:p>
             <a:fld id="{4509A250-FF31-4206-8172-F9D3106AACB1}" type="datetimeFigureOut">
               <a:rPr lang="en-US" smtClean="0"/>
-              <a:t>2019-03-01</a:t>
+              <a:t>1/11/2020</a:t>
             </a:fld>
             <a:endParaRPr lang="en-US" dirty="0"/>
           </a:p>
@@ -19951,7 +19810,7 @@
           <a:p>
             <a:fld id="{4509A250-FF31-4206-8172-F9D3106AACB1}" type="datetimeFigureOut">
               <a:rPr lang="en-US" smtClean="0"/>
-              <a:t>2019-03-01</a:t>
+              <a:t>1/11/2020</a:t>
             </a:fld>
             <a:endParaRPr lang="en-US" dirty="0"/>
           </a:p>
@@ -20241,7 +20100,7 @@
           <a:p>
             <a:fld id="{4509A250-FF31-4206-8172-F9D3106AACB1}" type="datetimeFigureOut">
               <a:rPr lang="en-US" smtClean="0"/>
-              <a:t>2019-03-01</a:t>
+              <a:t>1/11/2020</a:t>
             </a:fld>
             <a:endParaRPr lang="en-US" dirty="0"/>
           </a:p>
@@ -20521,7 +20380,7 @@
           <a:p>
             <a:fld id="{4509A250-FF31-4206-8172-F9D3106AACB1}" type="datetimeFigureOut">
               <a:rPr lang="en-US" smtClean="0"/>
-              <a:t>2019-03-01</a:t>
+              <a:t>1/11/2020</a:t>
             </a:fld>
             <a:endParaRPr lang="en-US" dirty="0"/>
           </a:p>
@@ -20771,7 +20630,7 @@
           <a:p>
             <a:fld id="{4AAD347D-5ACD-4C99-B74B-A9C85AD731AF}" type="datetimeFigureOut">
               <a:rPr lang="en-US" smtClean="0"/>
-              <a:t>2019-03-01</a:t>
+              <a:t>1/11/2020</a:t>
             </a:fld>
             <a:endParaRPr lang="en-US" dirty="0"/>
           </a:p>
@@ -20914,7 +20773,6 @@
     <p:sldLayoutId id="2147483709" r:id="rId9"/>
     <p:sldLayoutId id="2147483710" r:id="rId10"/>
     <p:sldLayoutId id="2147483711" r:id="rId11"/>
-    <p:sldLayoutId id="2147483713" r:id="rId12"/>
   </p:sldLayoutIdLst>
   <p:hf sldNum="0" hdr="0" ftr="0" dt="0"/>
   <p:txStyles>
@@ -22968,10 +22826,138 @@
           </a:p>
         </p:txBody>
       </p:sp>
+      <p:sp>
+        <p:nvSpPr>
+          <p:cNvPr id="35" name="Rounded Rectangle 32">
+            <a:extLst>
+              <a:ext uri="{FF2B5EF4-FFF2-40B4-BE49-F238E27FC236}">
+                <a16:creationId xmlns:a16="http://schemas.microsoft.com/office/drawing/2014/main" id="{05763E95-3B59-47A2-9D38-4A49CB42D32B}"/>
+              </a:ext>
+            </a:extLst>
+          </p:cNvPr>
+          <p:cNvSpPr/>
+          <p:nvPr/>
+        </p:nvSpPr>
+        <p:spPr>
+          <a:xfrm>
+            <a:off x="7026077" y="5002240"/>
+            <a:ext cx="1525423" cy="499735"/>
+          </a:xfrm>
+          <a:prstGeom prst="roundRect">
+            <a:avLst>
+              <a:gd name="adj" fmla="val 0"/>
+            </a:avLst>
+          </a:prstGeom>
+          <a:solidFill>
+            <a:srgbClr val="008DB5"/>
+          </a:solidFill>
+          <a:ln>
+            <a:noFill/>
+          </a:ln>
+          <a:effectLst/>
+        </p:spPr>
+        <p:style>
+          <a:lnRef idx="1">
+            <a:schemeClr val="accent1"/>
+          </a:lnRef>
+          <a:fillRef idx="3">
+            <a:schemeClr val="accent1"/>
+          </a:fillRef>
+          <a:effectRef idx="2">
+            <a:schemeClr val="accent1"/>
+          </a:effectRef>
+          <a:fontRef idx="minor">
+            <a:schemeClr val="lt1"/>
+          </a:fontRef>
+        </p:style>
+        <p:txBody>
+          <a:bodyPr rtlCol="0" anchor="ctr"/>
+          <a:lstStyle/>
+          <a:p>
+            <a:pPr algn="ctr"/>
+            <a:r>
+              <a:rPr lang="sk-SK" sz="1324" dirty="0" err="1">
+                <a:solidFill>
+                  <a:schemeClr val="bg2"/>
+                </a:solidFill>
+                <a:cs typeface="Helvetica Light"/>
+              </a:rPr>
+              <a:t>Map</a:t>
+            </a:r>
+            <a:endParaRPr lang="en-US" sz="1324" dirty="0">
+              <a:solidFill>
+                <a:schemeClr val="bg2"/>
+              </a:solidFill>
+              <a:cs typeface="Helvetica Light"/>
+            </a:endParaRPr>
+          </a:p>
+        </p:txBody>
+      </p:sp>
+      <p:sp>
+        <p:nvSpPr>
+          <p:cNvPr id="36" name="Rounded Rectangle 32">
+            <a:extLst>
+              <a:ext uri="{FF2B5EF4-FFF2-40B4-BE49-F238E27FC236}">
+                <a16:creationId xmlns:a16="http://schemas.microsoft.com/office/drawing/2014/main" id="{A3A0E90F-D87D-43BD-BA87-4276851706EB}"/>
+              </a:ext>
+            </a:extLst>
+          </p:cNvPr>
+          <p:cNvSpPr/>
+          <p:nvPr/>
+        </p:nvSpPr>
+        <p:spPr>
+          <a:xfrm>
+            <a:off x="8745418" y="5013719"/>
+            <a:ext cx="1525423" cy="499735"/>
+          </a:xfrm>
+          <a:prstGeom prst="roundRect">
+            <a:avLst>
+              <a:gd name="adj" fmla="val 0"/>
+            </a:avLst>
+          </a:prstGeom>
+          <a:solidFill>
+            <a:srgbClr val="008DB5"/>
+          </a:solidFill>
+          <a:ln>
+            <a:noFill/>
+          </a:ln>
+          <a:effectLst/>
+        </p:spPr>
+        <p:style>
+          <a:lnRef idx="1">
+            <a:schemeClr val="accent1"/>
+          </a:lnRef>
+          <a:fillRef idx="3">
+            <a:schemeClr val="accent1"/>
+          </a:fillRef>
+          <a:effectRef idx="2">
+            <a:schemeClr val="accent1"/>
+          </a:effectRef>
+          <a:fontRef idx="minor">
+            <a:schemeClr val="lt1"/>
+          </a:fontRef>
+        </p:style>
+        <p:txBody>
+          <a:bodyPr rtlCol="0" anchor="ctr"/>
+          <a:lstStyle/>
+          <a:p>
+            <a:pPr algn="ctr"/>
+            <a:r>
+              <a:rPr lang="en-US" sz="1324" dirty="0">
+                <a:solidFill>
+                  <a:schemeClr val="bg2"/>
+                </a:solidFill>
+                <a:cs typeface="Helvetica Light"/>
+              </a:rPr>
+              <a:t>…</a:t>
+            </a:r>
+          </a:p>
+        </p:txBody>
+      </p:sp>
     </p:spTree>
     <p:extLst>
       <p:ext uri="{BB962C8B-B14F-4D97-AF65-F5344CB8AC3E}">
-        <p14:creationId xmlns:p14="http://schemas.microsoft.com/office/powerpoint/2010/main" val="2849625223"/>
+        <p14:creationId xmlns:p14="http://schemas.microsoft.com/office/powerpoint/2010/main" val="2793752548"/>
       </p:ext>
     </p:extLst>
   </p:cSld>
@@ -23008,7 +22994,7 @@
       </p:grpSpPr>
       <p:sp>
         <p:nvSpPr>
-          <p:cNvPr id="49" name="Rectangle 48">
+          <p:cNvPr id="64" name="Rectangle 63">
             <a:extLst>
               <a:ext uri="{FF2B5EF4-FFF2-40B4-BE49-F238E27FC236}">
                 <a16:creationId xmlns:a16="http://schemas.microsoft.com/office/drawing/2014/main" id="{3A8EC506-B1DA-46A1-B44D-774E68468E13}"/>
@@ -23065,7 +23051,7 @@
       </p:sp>
       <p:sp>
         <p:nvSpPr>
-          <p:cNvPr id="51" name="Oval 5">
+          <p:cNvPr id="66" name="Oval 5">
             <a:extLst>
               <a:ext uri="{FF2B5EF4-FFF2-40B4-BE49-F238E27FC236}">
                 <a16:creationId xmlns:a16="http://schemas.microsoft.com/office/drawing/2014/main" id="{BFF30785-305E-45D7-984F-5AA93D3CA561}"/>
@@ -31683,7 +31669,7 @@
       </p:sp>
       <p:cxnSp>
         <p:nvCxnSpPr>
-          <p:cNvPr id="53" name="Straight Connector 52">
+          <p:cNvPr id="68" name="Straight Connector 67">
             <a:extLst>
               <a:ext uri="{FF2B5EF4-FFF2-40B4-BE49-F238E27FC236}">
                 <a16:creationId xmlns:a16="http://schemas.microsoft.com/office/drawing/2014/main" id="{15E01FA5-D766-43CA-A83D-E7CF3F04E96F}"/>
@@ -31737,7 +31723,7 @@
       </p:cxnSp>
       <p:sp useBgFill="1">
         <p:nvSpPr>
-          <p:cNvPr id="55" name="Rectangle 54">
+          <p:cNvPr id="70" name="Rectangle 69">
             <a:extLst>
               <a:ext uri="{FF2B5EF4-FFF2-40B4-BE49-F238E27FC236}">
                 <a16:creationId xmlns:a16="http://schemas.microsoft.com/office/drawing/2014/main" id="{C411DB08-1669-426B-BBEB-FAD285EF80FE}"/>
@@ -31797,7 +31783,7 @@
       </p:sp>
       <p:sp>
         <p:nvSpPr>
-          <p:cNvPr id="57" name="Rectangle 56">
+          <p:cNvPr id="100" name="Rectangle 71">
             <a:extLst>
               <a:ext uri="{FF2B5EF4-FFF2-40B4-BE49-F238E27FC236}">
                 <a16:creationId xmlns:a16="http://schemas.microsoft.com/office/drawing/2014/main" id="{029E4219-121F-4CD1-AA58-24746CD2923C}"/>
@@ -31855,6 +31841,55 @@
           <a:p>
             <a:pPr algn="ctr"/>
             <a:endParaRPr lang="en-US"/>
+          </a:p>
+        </p:txBody>
+      </p:sp>
+      <p:sp>
+        <p:nvSpPr>
+          <p:cNvPr id="8" name="Rectangle 7">
+            <a:extLst>
+              <a:ext uri="{FF2B5EF4-FFF2-40B4-BE49-F238E27FC236}">
+                <a16:creationId xmlns:a16="http://schemas.microsoft.com/office/drawing/2014/main" id="{1D15CF00-8B8D-40D6-B010-37977BEF98C2}"/>
+              </a:ext>
+            </a:extLst>
+          </p:cNvPr>
+          <p:cNvSpPr/>
+          <p:nvPr/>
+        </p:nvSpPr>
+        <p:spPr>
+          <a:xfrm>
+            <a:off x="0" y="0"/>
+            <a:ext cx="8126597" cy="6858000"/>
+          </a:xfrm>
+          <a:prstGeom prst="rect">
+            <a:avLst/>
+          </a:prstGeom>
+          <a:solidFill>
+            <a:srgbClr val="1482AC"/>
+          </a:solidFill>
+        </p:spPr>
+        <p:style>
+          <a:lnRef idx="2">
+            <a:schemeClr val="accent1">
+              <a:shade val="50000"/>
+            </a:schemeClr>
+          </a:lnRef>
+          <a:fillRef idx="1">
+            <a:schemeClr val="accent1"/>
+          </a:fillRef>
+          <a:effectRef idx="0">
+            <a:schemeClr val="accent1"/>
+          </a:effectRef>
+          <a:fontRef idx="minor">
+            <a:schemeClr val="lt1"/>
+          </a:fontRef>
+        </p:style>
+        <p:txBody>
+          <a:bodyPr rtlCol="0" anchor="ctr"/>
+          <a:lstStyle/>
+          <a:p>
+            <a:pPr algn="ctr"/>
+            <a:endParaRPr lang="sk-SK"/>
           </a:p>
         </p:txBody>
       </p:sp>
@@ -31947,7 +31982,7 @@
       </p:sp>
       <p:cxnSp>
         <p:nvCxnSpPr>
-          <p:cNvPr id="59" name="Straight Connector 58">
+          <p:cNvPr id="101" name="Straight Connector 73">
             <a:extLst>
               <a:ext uri="{FF2B5EF4-FFF2-40B4-BE49-F238E27FC236}">
                 <a16:creationId xmlns:a16="http://schemas.microsoft.com/office/drawing/2014/main" id="{52F50912-06FD-4216-BAD3-21050F59564A}"/>
@@ -32071,3436 +32106,6 @@
       </p:grpSpPr>
       <p:sp>
         <p:nvSpPr>
-          <p:cNvPr id="2" name="Nadpis 1"/>
-          <p:cNvSpPr>
-            <a:spLocks noGrp="1"/>
-          </p:cNvSpPr>
-          <p:nvPr>
-            <p:ph type="title"/>
-          </p:nvPr>
-        </p:nvSpPr>
-        <p:spPr/>
-        <p:txBody>
-          <a:bodyPr/>
-          <a:lstStyle/>
-          <a:p>
-            <a:r>
-              <a:rPr lang="cs-CZ" dirty="0" err="1"/>
-              <a:t>TableView</a:t>
-            </a:r>
-            <a:endParaRPr lang="cs-CZ" dirty="0"/>
-          </a:p>
-        </p:txBody>
-      </p:sp>
-      <p:sp>
-        <p:nvSpPr>
-          <p:cNvPr id="3" name="Zástupný symbol pro obsah 2"/>
-          <p:cNvSpPr>
-            <a:spLocks noGrp="1"/>
-          </p:cNvSpPr>
-          <p:nvPr>
-            <p:ph idx="1"/>
-          </p:nvPr>
-        </p:nvSpPr>
-        <p:spPr/>
-        <p:txBody>
-          <a:bodyPr/>
-          <a:lstStyle/>
-          <a:p>
-            <a:r>
-              <a:rPr lang="cs-CZ" dirty="0"/>
-              <a:t>Vhodné pro formuláře – sekce, buňky…</a:t>
-            </a:r>
-          </a:p>
-        </p:txBody>
-      </p:sp>
-      <p:pic>
-        <p:nvPicPr>
-          <p:cNvPr id="5122" name="Picture 2" descr="http://developer.xamarin.com/guides/cross-platform/xamarin-forms/working-with/tableview/Images/TableView-all-sml.png"/>
-          <p:cNvPicPr>
-            <a:picLocks noChangeAspect="1" noChangeArrowheads="1"/>
-          </p:cNvPicPr>
-          <p:nvPr/>
-        </p:nvPicPr>
-        <p:blipFill>
-          <a:blip r:embed="rId2">
-            <a:extLst>
-              <a:ext uri="{28A0092B-C50C-407E-A947-70E740481C1C}">
-                <a14:useLocalDpi xmlns:a14="http://schemas.microsoft.com/office/drawing/2010/main" val="0"/>
-              </a:ext>
-            </a:extLst>
-          </a:blip>
-          <a:srcRect/>
-          <a:stretch>
-            <a:fillRect/>
-          </a:stretch>
-        </p:blipFill>
-        <p:spPr bwMode="auto">
-          <a:xfrm>
-            <a:off x="2152650" y="2794397"/>
-            <a:ext cx="5715000" cy="3362326"/>
-          </a:xfrm>
-          <a:prstGeom prst="rect">
-            <a:avLst/>
-          </a:prstGeom>
-          <a:noFill/>
-          <a:extLst>
-            <a:ext uri="{909E8E84-426E-40DD-AFC4-6F175D3DCCD1}">
-              <a14:hiddenFill xmlns:a14="http://schemas.microsoft.com/office/drawing/2010/main">
-                <a:solidFill>
-                  <a:srgbClr val="FFFFFF"/>
-                </a:solidFill>
-              </a14:hiddenFill>
-            </a:ext>
-          </a:extLst>
-        </p:spPr>
-      </p:pic>
-      <p:sp>
-        <p:nvSpPr>
-          <p:cNvPr id="4" name="TextovéPole 3"/>
-          <p:cNvSpPr txBox="1"/>
-          <p:nvPr/>
-        </p:nvSpPr>
-        <p:spPr>
-          <a:xfrm>
-            <a:off x="8220076" y="2628901"/>
-            <a:ext cx="2009775" cy="3693319"/>
-          </a:xfrm>
-          <a:prstGeom prst="rect">
-            <a:avLst/>
-          </a:prstGeom>
-          <a:noFill/>
-        </p:spPr>
-        <p:txBody>
-          <a:bodyPr wrap="square" rtlCol="0">
-            <a:spAutoFit/>
-          </a:bodyPr>
-          <a:lstStyle/>
-          <a:p>
-            <a:r>
-              <a:rPr lang="cs-CZ" dirty="0" err="1"/>
-              <a:t>TableSection</a:t>
-            </a:r>
-            <a:endParaRPr lang="cs-CZ" dirty="0"/>
-          </a:p>
-          <a:p>
-            <a:r>
-              <a:rPr lang="cs-CZ" dirty="0"/>
-              <a:t>    </a:t>
-            </a:r>
-            <a:r>
-              <a:rPr lang="cs-CZ" dirty="0" err="1"/>
-              <a:t>SwitchCell</a:t>
-            </a:r>
-            <a:endParaRPr lang="cs-CZ" dirty="0"/>
-          </a:p>
-          <a:p>
-            <a:r>
-              <a:rPr lang="cs-CZ" dirty="0"/>
-              <a:t>    </a:t>
-            </a:r>
-            <a:r>
-              <a:rPr lang="cs-CZ" dirty="0" err="1"/>
-              <a:t>SwitchCell</a:t>
-            </a:r>
-            <a:endParaRPr lang="cs-CZ" dirty="0"/>
-          </a:p>
-          <a:p>
-            <a:endParaRPr lang="cs-CZ" dirty="0"/>
-          </a:p>
-          <a:p>
-            <a:r>
-              <a:rPr lang="cs-CZ" dirty="0" err="1"/>
-              <a:t>TableSection</a:t>
-            </a:r>
-            <a:endParaRPr lang="cs-CZ" dirty="0"/>
-          </a:p>
-          <a:p>
-            <a:r>
-              <a:rPr lang="cs-CZ" dirty="0"/>
-              <a:t>    </a:t>
-            </a:r>
-            <a:r>
-              <a:rPr lang="cs-CZ" dirty="0" err="1"/>
-              <a:t>EntryCell</a:t>
-            </a:r>
-            <a:endParaRPr lang="cs-CZ" dirty="0"/>
-          </a:p>
-          <a:p>
-            <a:r>
-              <a:rPr lang="cs-CZ" dirty="0"/>
-              <a:t>    </a:t>
-            </a:r>
-            <a:r>
-              <a:rPr lang="cs-CZ" dirty="0" err="1"/>
-              <a:t>EntryCell</a:t>
-            </a:r>
-            <a:endParaRPr lang="cs-CZ" dirty="0"/>
-          </a:p>
-          <a:p>
-            <a:endParaRPr lang="cs-CZ" dirty="0"/>
-          </a:p>
-          <a:p>
-            <a:r>
-              <a:rPr lang="cs-CZ" dirty="0" err="1"/>
-              <a:t>TableSection</a:t>
-            </a:r>
-            <a:endParaRPr lang="cs-CZ" dirty="0"/>
-          </a:p>
-          <a:p>
-            <a:r>
-              <a:rPr lang="cs-CZ" dirty="0"/>
-              <a:t>    </a:t>
-            </a:r>
-            <a:r>
-              <a:rPr lang="cs-CZ" dirty="0" err="1"/>
-              <a:t>SwitchCell</a:t>
-            </a:r>
-            <a:endParaRPr lang="cs-CZ" dirty="0"/>
-          </a:p>
-          <a:p>
-            <a:r>
-              <a:rPr lang="cs-CZ" dirty="0"/>
-              <a:t>    </a:t>
-            </a:r>
-            <a:r>
-              <a:rPr lang="cs-CZ" dirty="0" err="1"/>
-              <a:t>ViewCell</a:t>
-            </a:r>
-            <a:endParaRPr lang="cs-CZ" dirty="0"/>
-          </a:p>
-          <a:p>
-            <a:r>
-              <a:rPr lang="cs-CZ" dirty="0"/>
-              <a:t>        </a:t>
-            </a:r>
-            <a:r>
-              <a:rPr lang="cs-CZ" dirty="0" err="1"/>
-              <a:t>Slider</a:t>
-            </a:r>
-            <a:endParaRPr lang="cs-CZ" dirty="0"/>
-          </a:p>
-          <a:p>
-            <a:r>
-              <a:rPr lang="cs-CZ" dirty="0"/>
-              <a:t>…</a:t>
-            </a:r>
-          </a:p>
-        </p:txBody>
-      </p:sp>
-    </p:spTree>
-    <p:extLst>
-      <p:ext uri="{BB962C8B-B14F-4D97-AF65-F5344CB8AC3E}">
-        <p14:creationId xmlns:p14="http://schemas.microsoft.com/office/powerpoint/2010/main" val="2948637237"/>
-      </p:ext>
-    </p:extLst>
-  </p:cSld>
-  <p:clrMapOvr>
-    <a:masterClrMapping/>
-  </p:clrMapOvr>
-</p:sld>
-</file>
-
-<file path=ppt/slides/slide13.xml><?xml version="1.0" encoding="utf-8"?>
-<p:sld xmlns:a="http://schemas.openxmlformats.org/drawingml/2006/main" xmlns:r="http://schemas.openxmlformats.org/officeDocument/2006/relationships" xmlns:p="http://schemas.openxmlformats.org/presentationml/2006/main">
-  <p:cSld>
-    <p:spTree>
-      <p:nvGrpSpPr>
-        <p:cNvPr id="1" name=""/>
-        <p:cNvGrpSpPr/>
-        <p:nvPr/>
-      </p:nvGrpSpPr>
-      <p:grpSpPr>
-        <a:xfrm>
-          <a:off x="0" y="0"/>
-          <a:ext cx="0" cy="0"/>
-          <a:chOff x="0" y="0"/>
-          <a:chExt cx="0" cy="0"/>
-        </a:xfrm>
-      </p:grpSpPr>
-      <p:sp>
-        <p:nvSpPr>
-          <p:cNvPr id="2" name="Title 1"/>
-          <p:cNvSpPr>
-            <a:spLocks noGrp="1"/>
-          </p:cNvSpPr>
-          <p:nvPr>
-            <p:ph type="title"/>
-          </p:nvPr>
-        </p:nvSpPr>
-        <p:spPr/>
-        <p:txBody>
-          <a:bodyPr/>
-          <a:lstStyle/>
-          <a:p>
-            <a:r>
-              <a:rPr lang="sk-SK" dirty="0" err="1"/>
-              <a:t>EntryCell</a:t>
-            </a:r>
-            <a:endParaRPr lang="cs-CZ" dirty="0"/>
-          </a:p>
-        </p:txBody>
-      </p:sp>
-      <p:pic>
-        <p:nvPicPr>
-          <p:cNvPr id="4" name="Content Placeholder 3"/>
-          <p:cNvPicPr>
-            <a:picLocks noGrp="1" noChangeAspect="1"/>
-          </p:cNvPicPr>
-          <p:nvPr>
-            <p:ph idx="1"/>
-          </p:nvPr>
-        </p:nvPicPr>
-        <p:blipFill>
-          <a:blip r:embed="rId2">
-            <a:extLst>
-              <a:ext uri="{28A0092B-C50C-407E-A947-70E740481C1C}">
-                <a14:useLocalDpi xmlns:a14="http://schemas.microsoft.com/office/drawing/2010/main" val="0"/>
-              </a:ext>
-            </a:extLst>
-          </a:blip>
-          <a:stretch>
-            <a:fillRect/>
-          </a:stretch>
-        </p:blipFill>
-        <p:spPr>
-          <a:xfrm>
-            <a:off x="2333656" y="1556792"/>
-            <a:ext cx="7524688" cy="4420300"/>
-          </a:xfrm>
-        </p:spPr>
-      </p:pic>
-    </p:spTree>
-    <p:extLst>
-      <p:ext uri="{BB962C8B-B14F-4D97-AF65-F5344CB8AC3E}">
-        <p14:creationId xmlns:p14="http://schemas.microsoft.com/office/powerpoint/2010/main" val="1654115512"/>
-      </p:ext>
-    </p:extLst>
-  </p:cSld>
-  <p:clrMapOvr>
-    <a:masterClrMapping/>
-  </p:clrMapOvr>
-</p:sld>
-</file>
-
-<file path=ppt/slides/slide14.xml><?xml version="1.0" encoding="utf-8"?>
-<p:sld xmlns:a="http://schemas.openxmlformats.org/drawingml/2006/main" xmlns:r="http://schemas.openxmlformats.org/officeDocument/2006/relationships" xmlns:p="http://schemas.openxmlformats.org/presentationml/2006/main">
-  <p:cSld>
-    <p:spTree>
-      <p:nvGrpSpPr>
-        <p:cNvPr id="1" name=""/>
-        <p:cNvGrpSpPr/>
-        <p:nvPr/>
-      </p:nvGrpSpPr>
-      <p:grpSpPr>
-        <a:xfrm>
-          <a:off x="0" y="0"/>
-          <a:ext cx="0" cy="0"/>
-          <a:chOff x="0" y="0"/>
-          <a:chExt cx="0" cy="0"/>
-        </a:xfrm>
-      </p:grpSpPr>
-      <p:sp>
-        <p:nvSpPr>
-          <p:cNvPr id="2" name="Title 1"/>
-          <p:cNvSpPr>
-            <a:spLocks noGrp="1"/>
-          </p:cNvSpPr>
-          <p:nvPr>
-            <p:ph type="title"/>
-          </p:nvPr>
-        </p:nvSpPr>
-        <p:spPr/>
-        <p:txBody>
-          <a:bodyPr/>
-          <a:lstStyle/>
-          <a:p>
-            <a:r>
-              <a:rPr lang="sk-SK" dirty="0" err="1"/>
-              <a:t>SwitchCell</a:t>
-            </a:r>
-            <a:endParaRPr lang="sk-SK" dirty="0"/>
-          </a:p>
-        </p:txBody>
-      </p:sp>
-      <p:sp>
-        <p:nvSpPr>
-          <p:cNvPr id="3" name="Content Placeholder 2"/>
-          <p:cNvSpPr>
-            <a:spLocks noGrp="1"/>
-          </p:cNvSpPr>
-          <p:nvPr>
-            <p:ph idx="1"/>
-          </p:nvPr>
-        </p:nvSpPr>
-        <p:spPr/>
-        <p:txBody>
-          <a:bodyPr/>
-          <a:lstStyle/>
-          <a:p>
-            <a:endParaRPr lang="sk-SK" dirty="0"/>
-          </a:p>
-          <a:p>
-            <a:endParaRPr lang="sk-SK" dirty="0"/>
-          </a:p>
-          <a:p>
-            <a:endParaRPr lang="sk-SK" dirty="0"/>
-          </a:p>
-          <a:p>
-            <a:endParaRPr lang="sk-SK" dirty="0"/>
-          </a:p>
-          <a:p>
-            <a:endParaRPr lang="cs-CZ" dirty="0"/>
-          </a:p>
-        </p:txBody>
-      </p:sp>
-      <p:pic>
-        <p:nvPicPr>
-          <p:cNvPr id="6" name="Picture 5"/>
-          <p:cNvPicPr>
-            <a:picLocks noChangeAspect="1"/>
-          </p:cNvPicPr>
-          <p:nvPr/>
-        </p:nvPicPr>
-        <p:blipFill>
-          <a:blip r:embed="rId2">
-            <a:extLst>
-              <a:ext uri="{28A0092B-C50C-407E-A947-70E740481C1C}">
-                <a14:useLocalDpi xmlns:a14="http://schemas.microsoft.com/office/drawing/2010/main" val="0"/>
-              </a:ext>
-            </a:extLst>
-          </a:blip>
-          <a:stretch>
-            <a:fillRect/>
-          </a:stretch>
-        </p:blipFill>
-        <p:spPr>
-          <a:xfrm>
-            <a:off x="2593314" y="1600202"/>
-            <a:ext cx="7005373" cy="4146037"/>
-          </a:xfrm>
-          <a:prstGeom prst="rect">
-            <a:avLst/>
-          </a:prstGeom>
-        </p:spPr>
-      </p:pic>
-    </p:spTree>
-    <p:extLst>
-      <p:ext uri="{BB962C8B-B14F-4D97-AF65-F5344CB8AC3E}">
-        <p14:creationId xmlns:p14="http://schemas.microsoft.com/office/powerpoint/2010/main" val="2831521334"/>
-      </p:ext>
-    </p:extLst>
-  </p:cSld>
-  <p:clrMapOvr>
-    <a:masterClrMapping/>
-  </p:clrMapOvr>
-</p:sld>
-</file>
-
-<file path=ppt/slides/slide15.xml><?xml version="1.0" encoding="utf-8"?>
-<p:sld xmlns:a="http://schemas.openxmlformats.org/drawingml/2006/main" xmlns:r="http://schemas.openxmlformats.org/officeDocument/2006/relationships" xmlns:p="http://schemas.openxmlformats.org/presentationml/2006/main">
-  <p:cSld>
-    <p:spTree>
-      <p:nvGrpSpPr>
-        <p:cNvPr id="1" name=""/>
-        <p:cNvGrpSpPr/>
-        <p:nvPr/>
-      </p:nvGrpSpPr>
-      <p:grpSpPr>
-        <a:xfrm>
-          <a:off x="0" y="0"/>
-          <a:ext cx="0" cy="0"/>
-          <a:chOff x="0" y="0"/>
-          <a:chExt cx="0" cy="0"/>
-        </a:xfrm>
-      </p:grpSpPr>
-      <p:sp>
-        <p:nvSpPr>
-          <p:cNvPr id="2" name="Title 1"/>
-          <p:cNvSpPr>
-            <a:spLocks noGrp="1"/>
-          </p:cNvSpPr>
-          <p:nvPr>
-            <p:ph type="title"/>
-          </p:nvPr>
-        </p:nvSpPr>
-        <p:spPr/>
-        <p:txBody>
-          <a:bodyPr/>
-          <a:lstStyle/>
-          <a:p>
-            <a:r>
-              <a:rPr lang="sk-SK" dirty="0" err="1"/>
-              <a:t>ImageCell</a:t>
-            </a:r>
-            <a:endParaRPr lang="cs-CZ" dirty="0"/>
-          </a:p>
-        </p:txBody>
-      </p:sp>
-      <p:pic>
-        <p:nvPicPr>
-          <p:cNvPr id="4" name="Content Placeholder 3"/>
-          <p:cNvPicPr>
-            <a:picLocks noGrp="1" noChangeAspect="1"/>
-          </p:cNvPicPr>
-          <p:nvPr>
-            <p:ph idx="1"/>
-          </p:nvPr>
-        </p:nvPicPr>
-        <p:blipFill>
-          <a:blip r:embed="rId2">
-            <a:extLst>
-              <a:ext uri="{28A0092B-C50C-407E-A947-70E740481C1C}">
-                <a14:useLocalDpi xmlns:a14="http://schemas.microsoft.com/office/drawing/2010/main" val="0"/>
-              </a:ext>
-            </a:extLst>
-          </a:blip>
-          <a:stretch>
-            <a:fillRect/>
-          </a:stretch>
-        </p:blipFill>
-        <p:spPr>
-          <a:xfrm>
-            <a:off x="2228026" y="1484785"/>
-            <a:ext cx="7735948" cy="4375703"/>
-          </a:xfrm>
-        </p:spPr>
-      </p:pic>
-    </p:spTree>
-    <p:extLst>
-      <p:ext uri="{BB962C8B-B14F-4D97-AF65-F5344CB8AC3E}">
-        <p14:creationId xmlns:p14="http://schemas.microsoft.com/office/powerpoint/2010/main" val="4258783328"/>
-      </p:ext>
-    </p:extLst>
-  </p:cSld>
-  <p:clrMapOvr>
-    <a:masterClrMapping/>
-  </p:clrMapOvr>
-</p:sld>
-</file>
-
-<file path=ppt/slides/slide16.xml><?xml version="1.0" encoding="utf-8"?>
-<p:sld xmlns:a="http://schemas.openxmlformats.org/drawingml/2006/main" xmlns:r="http://schemas.openxmlformats.org/officeDocument/2006/relationships" xmlns:p="http://schemas.openxmlformats.org/presentationml/2006/main">
-  <p:cSld>
-    <p:spTree>
-      <p:nvGrpSpPr>
-        <p:cNvPr id="1" name=""/>
-        <p:cNvGrpSpPr/>
-        <p:nvPr/>
-      </p:nvGrpSpPr>
-      <p:grpSpPr>
-        <a:xfrm>
-          <a:off x="0" y="0"/>
-          <a:ext cx="0" cy="0"/>
-          <a:chOff x="0" y="0"/>
-          <a:chExt cx="0" cy="0"/>
-        </a:xfrm>
-      </p:grpSpPr>
-      <p:sp>
-        <p:nvSpPr>
-          <p:cNvPr id="2" name="Title 1"/>
-          <p:cNvSpPr>
-            <a:spLocks noGrp="1"/>
-          </p:cNvSpPr>
-          <p:nvPr>
-            <p:ph type="title"/>
-          </p:nvPr>
-        </p:nvSpPr>
-        <p:spPr/>
-        <p:txBody>
-          <a:bodyPr/>
-          <a:lstStyle/>
-          <a:p>
-            <a:r>
-              <a:rPr lang="sk-SK" dirty="0" err="1"/>
-              <a:t>ViewCell</a:t>
-            </a:r>
-            <a:endParaRPr lang="cs-CZ" dirty="0"/>
-          </a:p>
-        </p:txBody>
-      </p:sp>
-      <p:pic>
-        <p:nvPicPr>
-          <p:cNvPr id="6" name="Picture 5"/>
-          <p:cNvPicPr>
-            <a:picLocks noChangeAspect="1"/>
-          </p:cNvPicPr>
-          <p:nvPr/>
-        </p:nvPicPr>
-        <p:blipFill>
-          <a:blip r:embed="rId2"/>
-          <a:stretch>
-            <a:fillRect/>
-          </a:stretch>
-        </p:blipFill>
-        <p:spPr>
-          <a:xfrm>
-            <a:off x="6888088" y="1268760"/>
-            <a:ext cx="2304256" cy="4663376"/>
-          </a:xfrm>
-          <a:prstGeom prst="rect">
-            <a:avLst/>
-          </a:prstGeom>
-        </p:spPr>
-      </p:pic>
-      <p:pic>
-        <p:nvPicPr>
-          <p:cNvPr id="12" name="Content Placeholder 11"/>
-          <p:cNvPicPr>
-            <a:picLocks noGrp="1" noChangeAspect="1"/>
-          </p:cNvPicPr>
-          <p:nvPr>
-            <p:ph idx="1"/>
-          </p:nvPr>
-        </p:nvPicPr>
-        <p:blipFill>
-          <a:blip r:embed="rId3">
-            <a:extLst>
-              <a:ext uri="{28A0092B-C50C-407E-A947-70E740481C1C}">
-                <a14:useLocalDpi xmlns:a14="http://schemas.microsoft.com/office/drawing/2010/main" val="0"/>
-              </a:ext>
-            </a:extLst>
-          </a:blip>
-          <a:stretch>
-            <a:fillRect/>
-          </a:stretch>
-        </p:blipFill>
-        <p:spPr>
-          <a:xfrm>
-            <a:off x="3071665" y="1268760"/>
-            <a:ext cx="2312463" cy="4663376"/>
-          </a:xfrm>
-        </p:spPr>
-      </p:pic>
-    </p:spTree>
-    <p:extLst>
-      <p:ext uri="{BB962C8B-B14F-4D97-AF65-F5344CB8AC3E}">
-        <p14:creationId xmlns:p14="http://schemas.microsoft.com/office/powerpoint/2010/main" val="3875236320"/>
-      </p:ext>
-    </p:extLst>
-  </p:cSld>
-  <p:clrMapOvr>
-    <a:masterClrMapping/>
-  </p:clrMapOvr>
-  <p:timing>
-    <p:tnLst>
-      <p:par>
-        <p:cTn id="1" dur="indefinite" restart="never" nodeType="tmRoot">
-          <p:childTnLst>
-            <p:seq concurrent="1" nextAc="seek">
-              <p:cTn id="2" dur="indefinite" nodeType="mainSeq">
-                <p:childTnLst>
-                  <p:par>
-                    <p:cTn id="3" fill="hold">
-                      <p:stCondLst>
-                        <p:cond delay="indefinite"/>
-                      </p:stCondLst>
-                      <p:childTnLst>
-                        <p:par>
-                          <p:cTn id="4" fill="hold">
-                            <p:stCondLst>
-                              <p:cond delay="0"/>
-                            </p:stCondLst>
-                            <p:childTnLst>
-                              <p:par>
-                                <p:cTn id="5" presetID="1" presetClass="entr" presetSubtype="0" fill="hold" nodeType="clickEffect">
-                                  <p:stCondLst>
-                                    <p:cond delay="0"/>
-                                  </p:stCondLst>
-                                  <p:childTnLst>
-                                    <p:set>
-                                      <p:cBhvr>
-                                        <p:cTn id="6" dur="1" fill="hold">
-                                          <p:stCondLst>
-                                            <p:cond delay="0"/>
-                                          </p:stCondLst>
-                                        </p:cTn>
-                                        <p:tgtEl>
-                                          <p:spTgt spid="12"/>
-                                        </p:tgtEl>
-                                        <p:attrNameLst>
-                                          <p:attrName>style.visibility</p:attrName>
-                                        </p:attrNameLst>
-                                      </p:cBhvr>
-                                      <p:to>
-                                        <p:strVal val="visible"/>
-                                      </p:to>
-                                    </p:set>
-                                  </p:childTnLst>
-                                </p:cTn>
-                              </p:par>
-                            </p:childTnLst>
-                          </p:cTn>
-                        </p:par>
-                      </p:childTnLst>
-                    </p:cTn>
-                  </p:par>
-                  <p:par>
-                    <p:cTn id="7" fill="hold">
-                      <p:stCondLst>
-                        <p:cond delay="indefinite"/>
-                      </p:stCondLst>
-                      <p:childTnLst>
-                        <p:par>
-                          <p:cTn id="8" fill="hold">
-                            <p:stCondLst>
-                              <p:cond delay="0"/>
-                            </p:stCondLst>
-                            <p:childTnLst>
-                              <p:par>
-                                <p:cTn id="9" presetID="1" presetClass="entr" presetSubtype="0" fill="hold" nodeType="clickEffect">
-                                  <p:stCondLst>
-                                    <p:cond delay="0"/>
-                                  </p:stCondLst>
-                                  <p:childTnLst>
-                                    <p:set>
-                                      <p:cBhvr>
-                                        <p:cTn id="10" dur="1" fill="hold">
-                                          <p:stCondLst>
-                                            <p:cond delay="0"/>
-                                          </p:stCondLst>
-                                        </p:cTn>
-                                        <p:tgtEl>
-                                          <p:spTgt spid="6"/>
-                                        </p:tgtEl>
-                                        <p:attrNameLst>
-                                          <p:attrName>style.visibility</p:attrName>
-                                        </p:attrNameLst>
-                                      </p:cBhvr>
-                                      <p:to>
-                                        <p:strVal val="visible"/>
-                                      </p:to>
-                                    </p:set>
-                                  </p:childTnLst>
-                                </p:cTn>
-                              </p:par>
-                            </p:childTnLst>
-                          </p:cTn>
-                        </p:par>
-                      </p:childTnLst>
-                    </p:cTn>
-                  </p:par>
-                </p:childTnLst>
-              </p:cTn>
-              <p:prevCondLst>
-                <p:cond evt="onPrev" delay="0">
-                  <p:tgtEl>
-                    <p:sldTgt/>
-                  </p:tgtEl>
-                </p:cond>
-              </p:prevCondLst>
-              <p:nextCondLst>
-                <p:cond evt="onNext" delay="0">
-                  <p:tgtEl>
-                    <p:sldTgt/>
-                  </p:tgtEl>
-                </p:cond>
-              </p:nextCondLst>
-            </p:seq>
-          </p:childTnLst>
-        </p:cTn>
-      </p:par>
-    </p:tnLst>
-  </p:timing>
-</p:sld>
-</file>
-
-<file path=ppt/slides/slide17.xml><?xml version="1.0" encoding="utf-8"?>
-<p:sld xmlns:a="http://schemas.openxmlformats.org/drawingml/2006/main" xmlns:r="http://schemas.openxmlformats.org/officeDocument/2006/relationships" xmlns:p="http://schemas.openxmlformats.org/presentationml/2006/main">
-  <p:cSld>
-    <p:spTree>
-      <p:nvGrpSpPr>
-        <p:cNvPr id="1" name=""/>
-        <p:cNvGrpSpPr/>
-        <p:nvPr/>
-      </p:nvGrpSpPr>
-      <p:grpSpPr>
-        <a:xfrm>
-          <a:off x="0" y="0"/>
-          <a:ext cx="0" cy="0"/>
-          <a:chOff x="0" y="0"/>
-          <a:chExt cx="0" cy="0"/>
-        </a:xfrm>
-      </p:grpSpPr>
-      <p:sp>
-        <p:nvSpPr>
-          <p:cNvPr id="2" name="Nadpis 1"/>
-          <p:cNvSpPr>
-            <a:spLocks noGrp="1"/>
-          </p:cNvSpPr>
-          <p:nvPr>
-            <p:ph type="title"/>
-          </p:nvPr>
-        </p:nvSpPr>
-        <p:spPr/>
-        <p:txBody>
-          <a:bodyPr/>
-          <a:lstStyle/>
-          <a:p>
-            <a:r>
-              <a:rPr lang="cs-CZ" dirty="0" err="1"/>
-              <a:t>Cells</a:t>
-            </a:r>
-            <a:r>
-              <a:rPr lang="cs-CZ" dirty="0"/>
-              <a:t> &amp; </a:t>
-            </a:r>
-            <a:r>
-              <a:rPr lang="cs-CZ" dirty="0" err="1"/>
-              <a:t>Lists</a:t>
-            </a:r>
-            <a:endParaRPr lang="cs-CZ" dirty="0"/>
-          </a:p>
-        </p:txBody>
-      </p:sp>
-      <p:sp>
-        <p:nvSpPr>
-          <p:cNvPr id="3" name="Zástupný symbol pro obsah 2"/>
-          <p:cNvSpPr>
-            <a:spLocks noGrp="1"/>
-          </p:cNvSpPr>
-          <p:nvPr>
-            <p:ph idx="1"/>
-          </p:nvPr>
-        </p:nvSpPr>
-        <p:spPr/>
-        <p:txBody>
-          <a:bodyPr>
-            <a:normAutofit/>
-          </a:bodyPr>
-          <a:lstStyle/>
-          <a:p>
-            <a:r>
-              <a:rPr lang="cs-CZ" dirty="0" err="1"/>
-              <a:t>TextCell</a:t>
-            </a:r>
-            <a:r>
-              <a:rPr lang="cs-CZ" dirty="0"/>
-              <a:t>, </a:t>
-            </a:r>
-            <a:r>
-              <a:rPr lang="cs-CZ" dirty="0" err="1"/>
-              <a:t>ImageCell</a:t>
-            </a:r>
-            <a:r>
-              <a:rPr lang="cs-CZ" dirty="0"/>
-              <a:t>, </a:t>
-            </a:r>
-            <a:r>
-              <a:rPr lang="cs-CZ" dirty="0" err="1"/>
-              <a:t>SwitchCell</a:t>
-            </a:r>
-            <a:r>
-              <a:rPr lang="cs-CZ" dirty="0"/>
-              <a:t>, </a:t>
-            </a:r>
-            <a:r>
-              <a:rPr lang="cs-CZ" dirty="0" err="1"/>
-              <a:t>EntryCell</a:t>
-            </a:r>
-            <a:r>
-              <a:rPr lang="cs-CZ" dirty="0"/>
-              <a:t>…</a:t>
-            </a:r>
-          </a:p>
-          <a:p>
-            <a:r>
-              <a:rPr lang="cs-CZ" dirty="0" err="1"/>
-              <a:t>ViewCell</a:t>
-            </a:r>
-            <a:r>
-              <a:rPr lang="cs-CZ" dirty="0"/>
-              <a:t> (dovnitř lze dát cokoliv)</a:t>
-            </a:r>
-          </a:p>
-          <a:p>
-            <a:pPr lvl="1"/>
-            <a:r>
-              <a:rPr lang="cs-CZ" dirty="0" err="1"/>
-              <a:t>ViewCell.ContextActions</a:t>
-            </a:r>
-            <a:r>
-              <a:rPr lang="cs-CZ" dirty="0"/>
-              <a:t> … kontextové menu</a:t>
-            </a:r>
-          </a:p>
-          <a:p>
-            <a:endParaRPr lang="cs-CZ" dirty="0"/>
-          </a:p>
-          <a:p>
-            <a:r>
-              <a:rPr lang="cs-CZ" dirty="0" err="1"/>
-              <a:t>ListView</a:t>
-            </a:r>
-            <a:endParaRPr lang="cs-CZ" dirty="0"/>
-          </a:p>
-          <a:p>
-            <a:pPr lvl="1"/>
-            <a:r>
-              <a:rPr lang="cs-CZ" dirty="0" err="1"/>
-              <a:t>ItemsSource</a:t>
-            </a:r>
-            <a:r>
-              <a:rPr lang="cs-CZ" dirty="0"/>
-              <a:t>="{</a:t>
-            </a:r>
-            <a:r>
-              <a:rPr lang="cs-CZ" dirty="0" err="1"/>
-              <a:t>Binding</a:t>
-            </a:r>
-            <a:r>
-              <a:rPr lang="cs-CZ" dirty="0"/>
-              <a:t>: …}"</a:t>
-            </a:r>
-          </a:p>
-          <a:p>
-            <a:pPr lvl="1"/>
-            <a:r>
-              <a:rPr lang="cs-CZ" dirty="0" err="1"/>
-              <a:t>IsPullToRefreshEnabled</a:t>
-            </a:r>
-            <a:r>
-              <a:rPr lang="cs-CZ" dirty="0"/>
-              <a:t> = </a:t>
-            </a:r>
-            <a:r>
-              <a:rPr lang="cs-CZ" dirty="0" err="1"/>
-              <a:t>true</a:t>
-            </a:r>
-            <a:r>
-              <a:rPr lang="cs-CZ" dirty="0"/>
-              <a:t> | </a:t>
-            </a:r>
-            <a:r>
-              <a:rPr lang="cs-CZ" dirty="0" err="1"/>
-              <a:t>false</a:t>
-            </a:r>
-            <a:endParaRPr lang="cs-CZ" dirty="0"/>
-          </a:p>
-          <a:p>
-            <a:pPr lvl="2"/>
-            <a:r>
-              <a:rPr lang="cs-CZ" dirty="0"/>
-              <a:t>zavolá </a:t>
-            </a:r>
-            <a:r>
-              <a:rPr lang="cs-CZ" dirty="0" err="1"/>
-              <a:t>RefreshCommand</a:t>
-            </a:r>
-            <a:endParaRPr lang="cs-CZ" dirty="0"/>
-          </a:p>
-          <a:p>
-            <a:pPr lvl="1"/>
-            <a:r>
-              <a:rPr lang="cs-CZ" dirty="0" err="1"/>
-              <a:t>HasUnevenRows</a:t>
-            </a:r>
-            <a:r>
-              <a:rPr lang="cs-CZ" dirty="0"/>
-              <a:t> = </a:t>
-            </a:r>
-            <a:r>
-              <a:rPr lang="cs-CZ" dirty="0" err="1"/>
-              <a:t>true</a:t>
-            </a:r>
-            <a:r>
-              <a:rPr lang="cs-CZ" dirty="0"/>
-              <a:t> | </a:t>
-            </a:r>
-            <a:r>
-              <a:rPr lang="cs-CZ" dirty="0" err="1"/>
-              <a:t>false</a:t>
-            </a:r>
-            <a:endParaRPr lang="cs-CZ" dirty="0"/>
-          </a:p>
-          <a:p>
-            <a:pPr lvl="2"/>
-            <a:r>
-              <a:rPr lang="cs-CZ" dirty="0"/>
-              <a:t>různé výšky řádků</a:t>
-            </a:r>
-          </a:p>
-          <a:p>
-            <a:pPr lvl="1"/>
-            <a:endParaRPr lang="cs-CZ" dirty="0"/>
-          </a:p>
-        </p:txBody>
-      </p:sp>
-    </p:spTree>
-    <p:extLst>
-      <p:ext uri="{BB962C8B-B14F-4D97-AF65-F5344CB8AC3E}">
-        <p14:creationId xmlns:p14="http://schemas.microsoft.com/office/powerpoint/2010/main" val="3101542956"/>
-      </p:ext>
-    </p:extLst>
-  </p:cSld>
-  <p:clrMapOvr>
-    <a:masterClrMapping/>
-  </p:clrMapOvr>
-  <p:timing>
-    <p:tnLst>
-      <p:par>
-        <p:cTn id="1" dur="indefinite" restart="never" nodeType="tmRoot">
-          <p:childTnLst>
-            <p:seq concurrent="1" nextAc="seek">
-              <p:cTn id="2" dur="indefinite" nodeType="mainSeq">
-                <p:childTnLst>
-                  <p:par>
-                    <p:cTn id="3" fill="hold">
-                      <p:stCondLst>
-                        <p:cond delay="indefinite"/>
-                      </p:stCondLst>
-                      <p:childTnLst>
-                        <p:par>
-                          <p:cTn id="4" fill="hold">
-                            <p:stCondLst>
-                              <p:cond delay="0"/>
-                            </p:stCondLst>
-                            <p:childTnLst>
-                              <p:par>
-                                <p:cTn id="5" presetID="1" presetClass="entr" presetSubtype="0" fill="hold" grpId="0" nodeType="clickEffect">
-                                  <p:stCondLst>
-                                    <p:cond delay="0"/>
-                                  </p:stCondLst>
-                                  <p:childTnLst>
-                                    <p:set>
-                                      <p:cBhvr>
-                                        <p:cTn id="6" dur="1" fill="hold">
-                                          <p:stCondLst>
-                                            <p:cond delay="0"/>
-                                          </p:stCondLst>
-                                        </p:cTn>
-                                        <p:tgtEl>
-                                          <p:spTgt spid="3">
-                                            <p:txEl>
-                                              <p:pRg st="0" end="0"/>
-                                            </p:txEl>
-                                          </p:spTgt>
-                                        </p:tgtEl>
-                                        <p:attrNameLst>
-                                          <p:attrName>style.visibility</p:attrName>
-                                        </p:attrNameLst>
-                                      </p:cBhvr>
-                                      <p:to>
-                                        <p:strVal val="visible"/>
-                                      </p:to>
-                                    </p:set>
-                                  </p:childTnLst>
-                                </p:cTn>
-                              </p:par>
-                            </p:childTnLst>
-                          </p:cTn>
-                        </p:par>
-                      </p:childTnLst>
-                    </p:cTn>
-                  </p:par>
-                  <p:par>
-                    <p:cTn id="7" fill="hold">
-                      <p:stCondLst>
-                        <p:cond delay="indefinite"/>
-                      </p:stCondLst>
-                      <p:childTnLst>
-                        <p:par>
-                          <p:cTn id="8" fill="hold">
-                            <p:stCondLst>
-                              <p:cond delay="0"/>
-                            </p:stCondLst>
-                            <p:childTnLst>
-                              <p:par>
-                                <p:cTn id="9" presetID="1" presetClass="entr" presetSubtype="0" fill="hold" grpId="0" nodeType="clickEffect">
-                                  <p:stCondLst>
-                                    <p:cond delay="0"/>
-                                  </p:stCondLst>
-                                  <p:childTnLst>
-                                    <p:set>
-                                      <p:cBhvr>
-                                        <p:cTn id="10" dur="1" fill="hold">
-                                          <p:stCondLst>
-                                            <p:cond delay="0"/>
-                                          </p:stCondLst>
-                                        </p:cTn>
-                                        <p:tgtEl>
-                                          <p:spTgt spid="3">
-                                            <p:txEl>
-                                              <p:pRg st="1" end="1"/>
-                                            </p:txEl>
-                                          </p:spTgt>
-                                        </p:tgtEl>
-                                        <p:attrNameLst>
-                                          <p:attrName>style.visibility</p:attrName>
-                                        </p:attrNameLst>
-                                      </p:cBhvr>
-                                      <p:to>
-                                        <p:strVal val="visible"/>
-                                      </p:to>
-                                    </p:set>
-                                  </p:childTnLst>
-                                </p:cTn>
-                              </p:par>
-                              <p:par>
-                                <p:cTn id="11" presetID="1" presetClass="entr" presetSubtype="0" fill="hold" grpId="0" nodeType="withEffect">
-                                  <p:stCondLst>
-                                    <p:cond delay="0"/>
-                                  </p:stCondLst>
-                                  <p:childTnLst>
-                                    <p:set>
-                                      <p:cBhvr>
-                                        <p:cTn id="12" dur="1" fill="hold">
-                                          <p:stCondLst>
-                                            <p:cond delay="0"/>
-                                          </p:stCondLst>
-                                        </p:cTn>
-                                        <p:tgtEl>
-                                          <p:spTgt spid="3">
-                                            <p:txEl>
-                                              <p:pRg st="2" end="2"/>
-                                            </p:txEl>
-                                          </p:spTgt>
-                                        </p:tgtEl>
-                                        <p:attrNameLst>
-                                          <p:attrName>style.visibility</p:attrName>
-                                        </p:attrNameLst>
-                                      </p:cBhvr>
-                                      <p:to>
-                                        <p:strVal val="visible"/>
-                                      </p:to>
-                                    </p:set>
-                                  </p:childTnLst>
-                                </p:cTn>
-                              </p:par>
-                            </p:childTnLst>
-                          </p:cTn>
-                        </p:par>
-                      </p:childTnLst>
-                    </p:cTn>
-                  </p:par>
-                  <p:par>
-                    <p:cTn id="13" fill="hold">
-                      <p:stCondLst>
-                        <p:cond delay="indefinite"/>
-                      </p:stCondLst>
-                      <p:childTnLst>
-                        <p:par>
-                          <p:cTn id="14" fill="hold">
-                            <p:stCondLst>
-                              <p:cond delay="0"/>
-                            </p:stCondLst>
-                            <p:childTnLst>
-                              <p:par>
-                                <p:cTn id="15" presetID="1" presetClass="entr" presetSubtype="0" fill="hold" grpId="0" nodeType="clickEffect">
-                                  <p:stCondLst>
-                                    <p:cond delay="0"/>
-                                  </p:stCondLst>
-                                  <p:childTnLst>
-                                    <p:set>
-                                      <p:cBhvr>
-                                        <p:cTn id="16" dur="1" fill="hold">
-                                          <p:stCondLst>
-                                            <p:cond delay="0"/>
-                                          </p:stCondLst>
-                                        </p:cTn>
-                                        <p:tgtEl>
-                                          <p:spTgt spid="3">
-                                            <p:txEl>
-                                              <p:pRg st="4" end="4"/>
-                                            </p:txEl>
-                                          </p:spTgt>
-                                        </p:tgtEl>
-                                        <p:attrNameLst>
-                                          <p:attrName>style.visibility</p:attrName>
-                                        </p:attrNameLst>
-                                      </p:cBhvr>
-                                      <p:to>
-                                        <p:strVal val="visible"/>
-                                      </p:to>
-                                    </p:set>
-                                  </p:childTnLst>
-                                </p:cTn>
-                              </p:par>
-                              <p:par>
-                                <p:cTn id="17" presetID="1" presetClass="entr" presetSubtype="0" fill="hold" grpId="0" nodeType="withEffect">
-                                  <p:stCondLst>
-                                    <p:cond delay="0"/>
-                                  </p:stCondLst>
-                                  <p:childTnLst>
-                                    <p:set>
-                                      <p:cBhvr>
-                                        <p:cTn id="18" dur="1" fill="hold">
-                                          <p:stCondLst>
-                                            <p:cond delay="0"/>
-                                          </p:stCondLst>
-                                        </p:cTn>
-                                        <p:tgtEl>
-                                          <p:spTgt spid="3">
-                                            <p:txEl>
-                                              <p:pRg st="5" end="5"/>
-                                            </p:txEl>
-                                          </p:spTgt>
-                                        </p:tgtEl>
-                                        <p:attrNameLst>
-                                          <p:attrName>style.visibility</p:attrName>
-                                        </p:attrNameLst>
-                                      </p:cBhvr>
-                                      <p:to>
-                                        <p:strVal val="visible"/>
-                                      </p:to>
-                                    </p:set>
-                                  </p:childTnLst>
-                                </p:cTn>
-                              </p:par>
-                              <p:par>
-                                <p:cTn id="19" presetID="1" presetClass="entr" presetSubtype="0" fill="hold" grpId="0" nodeType="withEffect">
-                                  <p:stCondLst>
-                                    <p:cond delay="0"/>
-                                  </p:stCondLst>
-                                  <p:childTnLst>
-                                    <p:set>
-                                      <p:cBhvr>
-                                        <p:cTn id="20" dur="1" fill="hold">
-                                          <p:stCondLst>
-                                            <p:cond delay="0"/>
-                                          </p:stCondLst>
-                                        </p:cTn>
-                                        <p:tgtEl>
-                                          <p:spTgt spid="3">
-                                            <p:txEl>
-                                              <p:pRg st="6" end="6"/>
-                                            </p:txEl>
-                                          </p:spTgt>
-                                        </p:tgtEl>
-                                        <p:attrNameLst>
-                                          <p:attrName>style.visibility</p:attrName>
-                                        </p:attrNameLst>
-                                      </p:cBhvr>
-                                      <p:to>
-                                        <p:strVal val="visible"/>
-                                      </p:to>
-                                    </p:set>
-                                  </p:childTnLst>
-                                </p:cTn>
-                              </p:par>
-                              <p:par>
-                                <p:cTn id="21" presetID="1" presetClass="entr" presetSubtype="0" fill="hold" grpId="0" nodeType="withEffect">
-                                  <p:stCondLst>
-                                    <p:cond delay="0"/>
-                                  </p:stCondLst>
-                                  <p:childTnLst>
-                                    <p:set>
-                                      <p:cBhvr>
-                                        <p:cTn id="22" dur="1" fill="hold">
-                                          <p:stCondLst>
-                                            <p:cond delay="0"/>
-                                          </p:stCondLst>
-                                        </p:cTn>
-                                        <p:tgtEl>
-                                          <p:spTgt spid="3">
-                                            <p:txEl>
-                                              <p:pRg st="7" end="7"/>
-                                            </p:txEl>
-                                          </p:spTgt>
-                                        </p:tgtEl>
-                                        <p:attrNameLst>
-                                          <p:attrName>style.visibility</p:attrName>
-                                        </p:attrNameLst>
-                                      </p:cBhvr>
-                                      <p:to>
-                                        <p:strVal val="visible"/>
-                                      </p:to>
-                                    </p:set>
-                                  </p:childTnLst>
-                                </p:cTn>
-                              </p:par>
-                              <p:par>
-                                <p:cTn id="23" presetID="1" presetClass="entr" presetSubtype="0" fill="hold" grpId="0" nodeType="withEffect">
-                                  <p:stCondLst>
-                                    <p:cond delay="0"/>
-                                  </p:stCondLst>
-                                  <p:childTnLst>
-                                    <p:set>
-                                      <p:cBhvr>
-                                        <p:cTn id="24" dur="1" fill="hold">
-                                          <p:stCondLst>
-                                            <p:cond delay="0"/>
-                                          </p:stCondLst>
-                                        </p:cTn>
-                                        <p:tgtEl>
-                                          <p:spTgt spid="3">
-                                            <p:txEl>
-                                              <p:pRg st="8" end="8"/>
-                                            </p:txEl>
-                                          </p:spTgt>
-                                        </p:tgtEl>
-                                        <p:attrNameLst>
-                                          <p:attrName>style.visibility</p:attrName>
-                                        </p:attrNameLst>
-                                      </p:cBhvr>
-                                      <p:to>
-                                        <p:strVal val="visible"/>
-                                      </p:to>
-                                    </p:set>
-                                  </p:childTnLst>
-                                </p:cTn>
-                              </p:par>
-                              <p:par>
-                                <p:cTn id="25" presetID="1" presetClass="entr" presetSubtype="0" fill="hold" grpId="0" nodeType="withEffect">
-                                  <p:stCondLst>
-                                    <p:cond delay="0"/>
-                                  </p:stCondLst>
-                                  <p:childTnLst>
-                                    <p:set>
-                                      <p:cBhvr>
-                                        <p:cTn id="26" dur="1" fill="hold">
-                                          <p:stCondLst>
-                                            <p:cond delay="0"/>
-                                          </p:stCondLst>
-                                        </p:cTn>
-                                        <p:tgtEl>
-                                          <p:spTgt spid="3">
-                                            <p:txEl>
-                                              <p:pRg st="9" end="9"/>
-                                            </p:txEl>
-                                          </p:spTgt>
-                                        </p:tgtEl>
-                                        <p:attrNameLst>
-                                          <p:attrName>style.visibility</p:attrName>
-                                        </p:attrNameLst>
-                                      </p:cBhvr>
-                                      <p:to>
-                                        <p:strVal val="visible"/>
-                                      </p:to>
-                                    </p:set>
-                                  </p:childTnLst>
-                                </p:cTn>
-                              </p:par>
-                            </p:childTnLst>
-                          </p:cTn>
-                        </p:par>
-                      </p:childTnLst>
-                    </p:cTn>
-                  </p:par>
-                </p:childTnLst>
-              </p:cTn>
-              <p:prevCondLst>
-                <p:cond evt="onPrev" delay="0">
-                  <p:tgtEl>
-                    <p:sldTgt/>
-                  </p:tgtEl>
-                </p:cond>
-              </p:prevCondLst>
-              <p:nextCondLst>
-                <p:cond evt="onNext" delay="0">
-                  <p:tgtEl>
-                    <p:sldTgt/>
-                  </p:tgtEl>
-                </p:cond>
-              </p:nextCondLst>
-            </p:seq>
-          </p:childTnLst>
-        </p:cTn>
-      </p:par>
-    </p:tnLst>
-    <p:bldLst>
-      <p:bldP spid="3" grpId="0" build="p"/>
-    </p:bldLst>
-  </p:timing>
-</p:sld>
-</file>
-
-<file path=ppt/slides/slide18.xml><?xml version="1.0" encoding="utf-8"?>
-<p:sld xmlns:a="http://schemas.openxmlformats.org/drawingml/2006/main" xmlns:r="http://schemas.openxmlformats.org/officeDocument/2006/relationships" xmlns:p="http://schemas.openxmlformats.org/presentationml/2006/main">
-  <p:cSld>
-    <p:spTree>
-      <p:nvGrpSpPr>
-        <p:cNvPr id="1" name=""/>
-        <p:cNvGrpSpPr/>
-        <p:nvPr/>
-      </p:nvGrpSpPr>
-      <p:grpSpPr>
-        <a:xfrm>
-          <a:off x="0" y="0"/>
-          <a:ext cx="0" cy="0"/>
-          <a:chOff x="0" y="0"/>
-          <a:chExt cx="0" cy="0"/>
-        </a:xfrm>
-      </p:grpSpPr>
-      <p:sp>
-        <p:nvSpPr>
-          <p:cNvPr id="3" name="Title 2"/>
-          <p:cNvSpPr>
-            <a:spLocks noGrp="1"/>
-          </p:cNvSpPr>
-          <p:nvPr>
-            <p:ph type="title" idx="4294967295"/>
-          </p:nvPr>
-        </p:nvSpPr>
-        <p:spPr>
-          <a:xfrm>
-            <a:off x="1926433" y="1073945"/>
-            <a:ext cx="8741569" cy="675085"/>
-          </a:xfrm>
-        </p:spPr>
-        <p:txBody>
-          <a:bodyPr>
-            <a:normAutofit fontScale="90000"/>
-          </a:bodyPr>
-          <a:lstStyle/>
-          <a:p>
-            <a:pPr algn="l"/>
-            <a:r>
-              <a:rPr lang="sk-SK" dirty="0">
-                <a:solidFill>
-                  <a:schemeClr val="bg2"/>
-                </a:solidFill>
-              </a:rPr>
-              <a:t>Komerční komponenty</a:t>
-            </a:r>
-            <a:endParaRPr lang="en-US" dirty="0">
-              <a:solidFill>
-                <a:schemeClr val="bg2"/>
-              </a:solidFill>
-            </a:endParaRPr>
-          </a:p>
-        </p:txBody>
-      </p:sp>
-      <p:grpSp>
-        <p:nvGrpSpPr>
-          <p:cNvPr id="2" name="Group 1"/>
-          <p:cNvGrpSpPr/>
-          <p:nvPr/>
-        </p:nvGrpSpPr>
-        <p:grpSpPr>
-          <a:xfrm>
-            <a:off x="1810841" y="2637270"/>
-            <a:ext cx="8572061" cy="2487153"/>
-            <a:chOff x="388937" y="2881509"/>
-            <a:chExt cx="11658598" cy="3382701"/>
-          </a:xfrm>
-        </p:grpSpPr>
-        <p:pic>
-          <p:nvPicPr>
-            <p:cNvPr id="6" name="Picture 5"/>
-            <p:cNvPicPr>
-              <a:picLocks noChangeAspect="1"/>
-            </p:cNvPicPr>
-            <p:nvPr/>
-          </p:nvPicPr>
-          <p:blipFill>
-            <a:blip r:embed="rId2">
-              <a:extLst>
-                <a:ext uri="{28A0092B-C50C-407E-A947-70E740481C1C}">
-                  <a14:useLocalDpi xmlns:a14="http://schemas.microsoft.com/office/drawing/2010/main"/>
-                </a:ext>
-              </a:extLst>
-            </a:blip>
-            <a:stretch>
-              <a:fillRect/>
-            </a:stretch>
-          </p:blipFill>
-          <p:spPr>
-            <a:xfrm>
-              <a:off x="388937" y="2881509"/>
-              <a:ext cx="11620500" cy="1884100"/>
-            </a:xfrm>
-            <a:prstGeom prst="rect">
-              <a:avLst/>
-            </a:prstGeom>
-          </p:spPr>
-        </p:pic>
-        <p:pic>
-          <p:nvPicPr>
-            <p:cNvPr id="4" name="Picture 3"/>
-            <p:cNvPicPr>
-              <a:picLocks noChangeAspect="1"/>
-            </p:cNvPicPr>
-            <p:nvPr/>
-          </p:nvPicPr>
-          <p:blipFill>
-            <a:blip r:embed="rId3">
-              <a:extLst>
-                <a:ext uri="{28A0092B-C50C-407E-A947-70E740481C1C}">
-                  <a14:useLocalDpi xmlns:a14="http://schemas.microsoft.com/office/drawing/2010/main"/>
-                </a:ext>
-              </a:extLst>
-            </a:blip>
-            <a:stretch>
-              <a:fillRect/>
-            </a:stretch>
-          </p:blipFill>
-          <p:spPr>
-            <a:xfrm>
-              <a:off x="427038" y="4380110"/>
-              <a:ext cx="11620497" cy="1884100"/>
-            </a:xfrm>
-            <a:prstGeom prst="rect">
-              <a:avLst/>
-            </a:prstGeom>
-          </p:spPr>
-        </p:pic>
-      </p:grpSp>
-    </p:spTree>
-    <p:extLst>
-      <p:ext uri="{BB962C8B-B14F-4D97-AF65-F5344CB8AC3E}">
-        <p14:creationId xmlns:p14="http://schemas.microsoft.com/office/powerpoint/2010/main" val="3610957216"/>
-      </p:ext>
-    </p:extLst>
-  </p:cSld>
-  <p:clrMapOvr>
-    <a:masterClrMapping/>
-  </p:clrMapOvr>
-  <p:transition spd="slow">
-    <p:push/>
-  </p:transition>
-</p:sld>
-</file>
-
-<file path=ppt/slides/slide19.xml><?xml version="1.0" encoding="utf-8"?>
-<p:sld xmlns:a="http://schemas.openxmlformats.org/drawingml/2006/main" xmlns:r="http://schemas.openxmlformats.org/officeDocument/2006/relationships" xmlns:p="http://schemas.openxmlformats.org/presentationml/2006/main">
-  <p:cSld>
-    <p:spTree>
-      <p:nvGrpSpPr>
-        <p:cNvPr id="1" name=""/>
-        <p:cNvGrpSpPr/>
-        <p:nvPr/>
-      </p:nvGrpSpPr>
-      <p:grpSpPr>
-        <a:xfrm>
-          <a:off x="0" y="0"/>
-          <a:ext cx="0" cy="0"/>
-          <a:chOff x="0" y="0"/>
-          <a:chExt cx="0" cy="0"/>
-        </a:xfrm>
-      </p:grpSpPr>
-      <p:sp>
-        <p:nvSpPr>
-          <p:cNvPr id="2" name="Nadpis 1">
-            <a:extLst>
-              <a:ext uri="{FF2B5EF4-FFF2-40B4-BE49-F238E27FC236}">
-                <a16:creationId xmlns:a16="http://schemas.microsoft.com/office/drawing/2014/main" id="{92F8A79A-B27D-4F10-8071-2D6279712C3F}"/>
-              </a:ext>
-            </a:extLst>
-          </p:cNvPr>
-          <p:cNvSpPr>
-            <a:spLocks noGrp="1"/>
-          </p:cNvSpPr>
-          <p:nvPr>
-            <p:ph type="title"/>
-          </p:nvPr>
-        </p:nvSpPr>
-        <p:spPr/>
-        <p:txBody>
-          <a:bodyPr/>
-          <a:lstStyle/>
-          <a:p>
-            <a:pPr algn="l"/>
-            <a:r>
-              <a:rPr lang="en-US" dirty="0" err="1"/>
-              <a:t>Str</a:t>
-            </a:r>
-            <a:r>
-              <a:rPr lang="sk-SK" dirty="0" err="1"/>
-              <a:t>ánky</a:t>
-            </a:r>
-            <a:endParaRPr lang="en-US" dirty="0"/>
-          </a:p>
-        </p:txBody>
-      </p:sp>
-      <p:sp>
-        <p:nvSpPr>
-          <p:cNvPr id="4" name="Zástupný symbol pro obsah 3">
-            <a:extLst>
-              <a:ext uri="{FF2B5EF4-FFF2-40B4-BE49-F238E27FC236}">
-                <a16:creationId xmlns:a16="http://schemas.microsoft.com/office/drawing/2014/main" id="{0BE0AA4B-1D71-4CA4-BDC6-75C34DDB94D3}"/>
-              </a:ext>
-            </a:extLst>
-          </p:cNvPr>
-          <p:cNvSpPr>
-            <a:spLocks noGrp="1"/>
-          </p:cNvSpPr>
-          <p:nvPr>
-            <p:ph sz="half" idx="1"/>
-          </p:nvPr>
-        </p:nvSpPr>
-        <p:spPr/>
-        <p:txBody>
-          <a:bodyPr/>
-          <a:lstStyle/>
-          <a:p>
-            <a:r>
-              <a:rPr lang="cs-CZ" b="1" dirty="0" err="1"/>
-              <a:t>Content</a:t>
-            </a:r>
-            <a:r>
-              <a:rPr lang="cs-CZ" b="1" dirty="0"/>
-              <a:t> </a:t>
-            </a:r>
-            <a:r>
-              <a:rPr lang="cs-CZ" b="1" dirty="0" err="1"/>
-              <a:t>Page</a:t>
-            </a:r>
-            <a:endParaRPr lang="cs-CZ" b="1" dirty="0"/>
-          </a:p>
-          <a:p>
-            <a:pPr marL="0" indent="0" algn="ctr">
-              <a:buNone/>
-            </a:pPr>
-            <a:r>
-              <a:rPr lang="cs-CZ" dirty="0"/>
-              <a:t>Jednoduchý obsah</a:t>
-            </a:r>
-          </a:p>
-          <a:p>
-            <a:endParaRPr lang="en-US" dirty="0"/>
-          </a:p>
-        </p:txBody>
-      </p:sp>
-      <p:sp>
-        <p:nvSpPr>
-          <p:cNvPr id="5" name="Zástupný symbol pro obsah 4">
-            <a:extLst>
-              <a:ext uri="{FF2B5EF4-FFF2-40B4-BE49-F238E27FC236}">
-                <a16:creationId xmlns:a16="http://schemas.microsoft.com/office/drawing/2014/main" id="{12C2FFF6-BB88-453F-B91C-4E809FDD80EF}"/>
-              </a:ext>
-            </a:extLst>
-          </p:cNvPr>
-          <p:cNvSpPr>
-            <a:spLocks noGrp="1"/>
-          </p:cNvSpPr>
-          <p:nvPr>
-            <p:ph sz="half" idx="2"/>
-          </p:nvPr>
-        </p:nvSpPr>
-        <p:spPr/>
-        <p:txBody>
-          <a:bodyPr/>
-          <a:lstStyle/>
-          <a:p>
-            <a:r>
-              <a:rPr lang="cs-CZ" b="1" dirty="0" err="1"/>
-              <a:t>MasterDetail</a:t>
-            </a:r>
-            <a:r>
-              <a:rPr lang="cs-CZ" b="1" dirty="0"/>
-              <a:t> </a:t>
-            </a:r>
-            <a:r>
-              <a:rPr lang="cs-CZ" b="1" dirty="0" err="1"/>
-              <a:t>Page</a:t>
-            </a:r>
-            <a:endParaRPr lang="cs-CZ" b="1" dirty="0"/>
-          </a:p>
-          <a:p>
-            <a:pPr marL="0" indent="0" algn="ctr">
-              <a:buNone/>
-            </a:pPr>
-            <a:r>
-              <a:rPr lang="cs-CZ" dirty="0"/>
-              <a:t>Seznam + detail položky</a:t>
-            </a:r>
-          </a:p>
-          <a:p>
-            <a:pPr lvl="1"/>
-            <a:endParaRPr lang="en-US" dirty="0"/>
-          </a:p>
-        </p:txBody>
-      </p:sp>
-      <p:pic>
-        <p:nvPicPr>
-          <p:cNvPr id="6" name="Obrázek 5">
-            <a:extLst>
-              <a:ext uri="{FF2B5EF4-FFF2-40B4-BE49-F238E27FC236}">
-                <a16:creationId xmlns:a16="http://schemas.microsoft.com/office/drawing/2014/main" id="{17F79902-F478-47A5-8668-9AD30E367725}"/>
-              </a:ext>
-            </a:extLst>
-          </p:cNvPr>
-          <p:cNvPicPr>
-            <a:picLocks noChangeAspect="1"/>
-          </p:cNvPicPr>
-          <p:nvPr/>
-        </p:nvPicPr>
-        <p:blipFill>
-          <a:blip r:embed="rId2"/>
-          <a:stretch>
-            <a:fillRect/>
-          </a:stretch>
-        </p:blipFill>
-        <p:spPr>
-          <a:xfrm>
-            <a:off x="3189944" y="3179026"/>
-            <a:ext cx="1621113" cy="3404338"/>
-          </a:xfrm>
-          <a:prstGeom prst="rect">
-            <a:avLst/>
-          </a:prstGeom>
-        </p:spPr>
-      </p:pic>
-      <p:pic>
-        <p:nvPicPr>
-          <p:cNvPr id="8" name="Obrázek 7">
-            <a:extLst>
-              <a:ext uri="{FF2B5EF4-FFF2-40B4-BE49-F238E27FC236}">
-                <a16:creationId xmlns:a16="http://schemas.microsoft.com/office/drawing/2014/main" id="{19858A42-CB52-4FA9-9F65-C43B933117A5}"/>
-              </a:ext>
-            </a:extLst>
-          </p:cNvPr>
-          <p:cNvPicPr>
-            <a:picLocks noChangeAspect="1"/>
-          </p:cNvPicPr>
-          <p:nvPr/>
-        </p:nvPicPr>
-        <p:blipFill>
-          <a:blip r:embed="rId3"/>
-          <a:stretch>
-            <a:fillRect/>
-          </a:stretch>
-        </p:blipFill>
-        <p:spPr>
-          <a:xfrm>
-            <a:off x="7340415" y="3212868"/>
-            <a:ext cx="1702170" cy="3404338"/>
-          </a:xfrm>
-          <a:prstGeom prst="rect">
-            <a:avLst/>
-          </a:prstGeom>
-        </p:spPr>
-      </p:pic>
-    </p:spTree>
-    <p:extLst>
-      <p:ext uri="{BB962C8B-B14F-4D97-AF65-F5344CB8AC3E}">
-        <p14:creationId xmlns:p14="http://schemas.microsoft.com/office/powerpoint/2010/main" val="3757833611"/>
-      </p:ext>
-    </p:extLst>
-  </p:cSld>
-  <p:clrMapOvr>
-    <a:masterClrMapping/>
-  </p:clrMapOvr>
-  <p:timing>
-    <p:tnLst>
-      <p:par>
-        <p:cTn id="1" dur="indefinite" restart="never" nodeType="tmRoot">
-          <p:childTnLst>
-            <p:seq concurrent="1" nextAc="seek">
-              <p:cTn id="2" dur="indefinite" nodeType="mainSeq">
-                <p:childTnLst>
-                  <p:par>
-                    <p:cTn id="3" fill="hold">
-                      <p:stCondLst>
-                        <p:cond delay="indefinite"/>
-                        <p:cond evt="onBegin" delay="0">
-                          <p:tn val="2"/>
-                        </p:cond>
-                      </p:stCondLst>
-                      <p:childTnLst>
-                        <p:par>
-                          <p:cTn id="4" fill="hold">
-                            <p:stCondLst>
-                              <p:cond delay="0"/>
-                            </p:stCondLst>
-                            <p:childTnLst>
-                              <p:par>
-                                <p:cTn id="5" presetID="1" presetClass="entr" presetSubtype="0" fill="hold" grpId="0" nodeType="withEffect">
-                                  <p:stCondLst>
-                                    <p:cond delay="0"/>
-                                  </p:stCondLst>
-                                  <p:childTnLst>
-                                    <p:set>
-                                      <p:cBhvr>
-                                        <p:cTn id="6" dur="1" fill="hold">
-                                          <p:stCondLst>
-                                            <p:cond delay="0"/>
-                                          </p:stCondLst>
-                                        </p:cTn>
-                                        <p:tgtEl>
-                                          <p:spTgt spid="4">
-                                            <p:txEl>
-                                              <p:pRg st="0" end="0"/>
-                                            </p:txEl>
-                                          </p:spTgt>
-                                        </p:tgtEl>
-                                        <p:attrNameLst>
-                                          <p:attrName>style.visibility</p:attrName>
-                                        </p:attrNameLst>
-                                      </p:cBhvr>
-                                      <p:to>
-                                        <p:strVal val="visible"/>
-                                      </p:to>
-                                    </p:set>
-                                  </p:childTnLst>
-                                </p:cTn>
-                              </p:par>
-                              <p:par>
-                                <p:cTn id="7" presetID="1" presetClass="entr" presetSubtype="0" fill="hold" grpId="0" nodeType="withEffect">
-                                  <p:stCondLst>
-                                    <p:cond delay="0"/>
-                                  </p:stCondLst>
-                                  <p:childTnLst>
-                                    <p:set>
-                                      <p:cBhvr>
-                                        <p:cTn id="8" dur="1" fill="hold">
-                                          <p:stCondLst>
-                                            <p:cond delay="0"/>
-                                          </p:stCondLst>
-                                        </p:cTn>
-                                        <p:tgtEl>
-                                          <p:spTgt spid="4">
-                                            <p:txEl>
-                                              <p:pRg st="1" end="1"/>
-                                            </p:txEl>
-                                          </p:spTgt>
-                                        </p:tgtEl>
-                                        <p:attrNameLst>
-                                          <p:attrName>style.visibility</p:attrName>
-                                        </p:attrNameLst>
-                                      </p:cBhvr>
-                                      <p:to>
-                                        <p:strVal val="visible"/>
-                                      </p:to>
-                                    </p:set>
-                                  </p:childTnLst>
-                                </p:cTn>
-                              </p:par>
-                              <p:par>
-                                <p:cTn id="9" presetID="1" presetClass="entr" presetSubtype="0" fill="hold" nodeType="withEffect">
-                                  <p:stCondLst>
-                                    <p:cond delay="0"/>
-                                  </p:stCondLst>
-                                  <p:childTnLst>
-                                    <p:set>
-                                      <p:cBhvr>
-                                        <p:cTn id="10" dur="1" fill="hold">
-                                          <p:stCondLst>
-                                            <p:cond delay="0"/>
-                                          </p:stCondLst>
-                                        </p:cTn>
-                                        <p:tgtEl>
-                                          <p:spTgt spid="6"/>
-                                        </p:tgtEl>
-                                        <p:attrNameLst>
-                                          <p:attrName>style.visibility</p:attrName>
-                                        </p:attrNameLst>
-                                      </p:cBhvr>
-                                      <p:to>
-                                        <p:strVal val="visible"/>
-                                      </p:to>
-                                    </p:set>
-                                  </p:childTnLst>
-                                </p:cTn>
-                              </p:par>
-                            </p:childTnLst>
-                          </p:cTn>
-                        </p:par>
-                      </p:childTnLst>
-                    </p:cTn>
-                  </p:par>
-                  <p:par>
-                    <p:cTn id="11" fill="hold">
-                      <p:stCondLst>
-                        <p:cond delay="indefinite"/>
-                      </p:stCondLst>
-                      <p:childTnLst>
-                        <p:par>
-                          <p:cTn id="12" fill="hold">
-                            <p:stCondLst>
-                              <p:cond delay="0"/>
-                            </p:stCondLst>
-                            <p:childTnLst>
-                              <p:par>
-                                <p:cTn id="13" presetID="1" presetClass="entr" presetSubtype="0" fill="hold" nodeType="clickEffect">
-                                  <p:stCondLst>
-                                    <p:cond delay="0"/>
-                                  </p:stCondLst>
-                                  <p:childTnLst>
-                                    <p:set>
-                                      <p:cBhvr>
-                                        <p:cTn id="14" dur="1" fill="hold">
-                                          <p:stCondLst>
-                                            <p:cond delay="0"/>
-                                          </p:stCondLst>
-                                        </p:cTn>
-                                        <p:tgtEl>
-                                          <p:spTgt spid="8"/>
-                                        </p:tgtEl>
-                                        <p:attrNameLst>
-                                          <p:attrName>style.visibility</p:attrName>
-                                        </p:attrNameLst>
-                                      </p:cBhvr>
-                                      <p:to>
-                                        <p:strVal val="visible"/>
-                                      </p:to>
-                                    </p:set>
-                                  </p:childTnLst>
-                                </p:cTn>
-                              </p:par>
-                              <p:par>
-                                <p:cTn id="15" presetID="1" presetClass="entr" presetSubtype="0" fill="hold" grpId="0" nodeType="withEffect">
-                                  <p:stCondLst>
-                                    <p:cond delay="0"/>
-                                  </p:stCondLst>
-                                  <p:childTnLst>
-                                    <p:set>
-                                      <p:cBhvr>
-                                        <p:cTn id="16" dur="1" fill="hold">
-                                          <p:stCondLst>
-                                            <p:cond delay="0"/>
-                                          </p:stCondLst>
-                                        </p:cTn>
-                                        <p:tgtEl>
-                                          <p:spTgt spid="5">
-                                            <p:txEl>
-                                              <p:pRg st="0" end="0"/>
-                                            </p:txEl>
-                                          </p:spTgt>
-                                        </p:tgtEl>
-                                        <p:attrNameLst>
-                                          <p:attrName>style.visibility</p:attrName>
-                                        </p:attrNameLst>
-                                      </p:cBhvr>
-                                      <p:to>
-                                        <p:strVal val="visible"/>
-                                      </p:to>
-                                    </p:set>
-                                  </p:childTnLst>
-                                </p:cTn>
-                              </p:par>
-                              <p:par>
-                                <p:cTn id="17" presetID="1" presetClass="entr" presetSubtype="0" fill="hold" grpId="0" nodeType="withEffect">
-                                  <p:stCondLst>
-                                    <p:cond delay="0"/>
-                                  </p:stCondLst>
-                                  <p:childTnLst>
-                                    <p:set>
-                                      <p:cBhvr>
-                                        <p:cTn id="18" dur="1" fill="hold">
-                                          <p:stCondLst>
-                                            <p:cond delay="0"/>
-                                          </p:stCondLst>
-                                        </p:cTn>
-                                        <p:tgtEl>
-                                          <p:spTgt spid="5">
-                                            <p:txEl>
-                                              <p:pRg st="1" end="1"/>
-                                            </p:txEl>
-                                          </p:spTgt>
-                                        </p:tgtEl>
-                                        <p:attrNameLst>
-                                          <p:attrName>style.visibility</p:attrName>
-                                        </p:attrNameLst>
-                                      </p:cBhvr>
-                                      <p:to>
-                                        <p:strVal val="visible"/>
-                                      </p:to>
-                                    </p:set>
-                                  </p:childTnLst>
-                                </p:cTn>
-                              </p:par>
-                            </p:childTnLst>
-                          </p:cTn>
-                        </p:par>
-                      </p:childTnLst>
-                    </p:cTn>
-                  </p:par>
-                </p:childTnLst>
-              </p:cTn>
-              <p:prevCondLst>
-                <p:cond evt="onPrev" delay="0">
-                  <p:tgtEl>
-                    <p:sldTgt/>
-                  </p:tgtEl>
-                </p:cond>
-              </p:prevCondLst>
-              <p:nextCondLst>
-                <p:cond evt="onNext" delay="0">
-                  <p:tgtEl>
-                    <p:sldTgt/>
-                  </p:tgtEl>
-                </p:cond>
-              </p:nextCondLst>
-            </p:seq>
-          </p:childTnLst>
-        </p:cTn>
-      </p:par>
-    </p:tnLst>
-    <p:bldLst>
-      <p:bldP spid="4" grpId="0" uiExpand="1" build="p"/>
-      <p:bldP spid="5" grpId="0" uiExpand="1" build="p"/>
-    </p:bldLst>
-  </p:timing>
-</p:sld>
-</file>
-
-<file path=ppt/slides/slide2.xml><?xml version="1.0" encoding="utf-8"?>
-<p:sld xmlns:a="http://schemas.openxmlformats.org/drawingml/2006/main" xmlns:r="http://schemas.openxmlformats.org/officeDocument/2006/relationships" xmlns:p="http://schemas.openxmlformats.org/presentationml/2006/main">
-  <p:cSld>
-    <p:spTree>
-      <p:nvGrpSpPr>
-        <p:cNvPr id="1" name=""/>
-        <p:cNvGrpSpPr/>
-        <p:nvPr/>
-      </p:nvGrpSpPr>
-      <p:grpSpPr>
-        <a:xfrm>
-          <a:off x="0" y="0"/>
-          <a:ext cx="0" cy="0"/>
-          <a:chOff x="0" y="0"/>
-          <a:chExt cx="0" cy="0"/>
-        </a:xfrm>
-      </p:grpSpPr>
-      <p:sp>
-        <p:nvSpPr>
-          <p:cNvPr id="4" name="Nadpis 3">
-            <a:extLst>
-              <a:ext uri="{FF2B5EF4-FFF2-40B4-BE49-F238E27FC236}">
-                <a16:creationId xmlns:a16="http://schemas.microsoft.com/office/drawing/2014/main" id="{A2FB38B9-C873-497B-8279-2D1A98BA8650}"/>
-              </a:ext>
-            </a:extLst>
-          </p:cNvPr>
-          <p:cNvSpPr>
-            <a:spLocks noGrp="1"/>
-          </p:cNvSpPr>
-          <p:nvPr>
-            <p:ph type="title"/>
-          </p:nvPr>
-        </p:nvSpPr>
-        <p:spPr/>
-        <p:txBody>
-          <a:bodyPr/>
-          <a:lstStyle/>
-          <a:p>
-            <a:pPr algn="l"/>
-            <a:r>
-              <a:rPr lang="cs-CZ" dirty="0" err="1"/>
-              <a:t>Layouts</a:t>
-            </a:r>
-            <a:r>
-              <a:rPr lang="cs-CZ" dirty="0"/>
-              <a:t> – jedna komponenta</a:t>
-            </a:r>
-            <a:endParaRPr lang="en-US" dirty="0"/>
-          </a:p>
-        </p:txBody>
-      </p:sp>
-      <p:sp>
-        <p:nvSpPr>
-          <p:cNvPr id="5" name="Zástupný symbol pro obsah 4">
-            <a:extLst>
-              <a:ext uri="{FF2B5EF4-FFF2-40B4-BE49-F238E27FC236}">
-                <a16:creationId xmlns:a16="http://schemas.microsoft.com/office/drawing/2014/main" id="{2F5839C5-C022-4648-AF6B-2261EDA6A76C}"/>
-              </a:ext>
-            </a:extLst>
-          </p:cNvPr>
-          <p:cNvSpPr>
-            <a:spLocks noGrp="1"/>
-          </p:cNvSpPr>
-          <p:nvPr>
-            <p:ph sz="half" idx="1"/>
-          </p:nvPr>
-        </p:nvSpPr>
-        <p:spPr>
-          <a:xfrm>
-            <a:off x="6172200" y="1600202"/>
-            <a:ext cx="4038600" cy="4525963"/>
-          </a:xfrm>
-        </p:spPr>
-        <p:txBody>
-          <a:bodyPr>
-            <a:normAutofit/>
-          </a:bodyPr>
-          <a:lstStyle/>
-          <a:p>
-            <a:r>
-              <a:rPr lang="en-US" b="1" dirty="0" err="1"/>
-              <a:t>ContentView</a:t>
-            </a:r>
-            <a:endParaRPr lang="en-US" b="1" dirty="0"/>
-          </a:p>
-          <a:p>
-            <a:pPr marL="0" indent="0" algn="ctr">
-              <a:buNone/>
-            </a:pPr>
-            <a:r>
-              <a:rPr lang="en-US" dirty="0" err="1"/>
-              <a:t>Jeden</a:t>
-            </a:r>
-            <a:r>
-              <a:rPr lang="en-US" dirty="0"/>
-              <a:t> </a:t>
-            </a:r>
-            <a:r>
-              <a:rPr lang="en-US" dirty="0" err="1"/>
-              <a:t>obsah</a:t>
-            </a:r>
-            <a:r>
-              <a:rPr lang="en-US" dirty="0"/>
-              <a:t>, b</a:t>
-            </a:r>
-            <a:r>
-              <a:rPr lang="cs-CZ" dirty="0" err="1"/>
-              <a:t>ázová</a:t>
-            </a:r>
-            <a:r>
-              <a:rPr lang="cs-CZ" dirty="0"/>
-              <a:t> třída</a:t>
-            </a:r>
-          </a:p>
-        </p:txBody>
-      </p:sp>
-      <p:sp>
-        <p:nvSpPr>
-          <p:cNvPr id="6" name="Zástupný symbol pro obsah 5">
-            <a:extLst>
-              <a:ext uri="{FF2B5EF4-FFF2-40B4-BE49-F238E27FC236}">
-                <a16:creationId xmlns:a16="http://schemas.microsoft.com/office/drawing/2014/main" id="{E32A623E-3F45-414D-8636-A4FF2E881A49}"/>
-              </a:ext>
-            </a:extLst>
-          </p:cNvPr>
-          <p:cNvSpPr>
-            <a:spLocks noGrp="1"/>
-          </p:cNvSpPr>
-          <p:nvPr>
-            <p:ph sz="half" idx="2"/>
-          </p:nvPr>
-        </p:nvSpPr>
-        <p:spPr>
-          <a:xfrm>
-            <a:off x="1981200" y="1600202"/>
-            <a:ext cx="4038600" cy="4525963"/>
-          </a:xfrm>
-        </p:spPr>
-        <p:txBody>
-          <a:bodyPr/>
-          <a:lstStyle/>
-          <a:p>
-            <a:r>
-              <a:rPr lang="cs-CZ" b="1" dirty="0" err="1"/>
-              <a:t>ContentPresenter</a:t>
-            </a:r>
-            <a:endParaRPr lang="cs-CZ" b="1" dirty="0"/>
-          </a:p>
-          <a:p>
-            <a:pPr marL="0" indent="0" algn="ctr">
-              <a:buNone/>
-            </a:pPr>
-            <a:r>
-              <a:rPr lang="en-US" dirty="0"/>
-              <a:t>M</a:t>
-            </a:r>
-            <a:r>
-              <a:rPr lang="cs-CZ" dirty="0" err="1"/>
-              <a:t>ísto</a:t>
-            </a:r>
-            <a:r>
-              <a:rPr lang="cs-CZ" dirty="0"/>
-              <a:t> pro obsah</a:t>
-            </a:r>
-            <a:r>
-              <a:rPr lang="en-US" dirty="0"/>
-              <a:t> - </a:t>
-            </a:r>
-            <a:r>
-              <a:rPr lang="cs-CZ" dirty="0"/>
-              <a:t>šablony</a:t>
-            </a:r>
-          </a:p>
-          <a:p>
-            <a:endParaRPr lang="en-US" dirty="0"/>
-          </a:p>
-        </p:txBody>
-      </p:sp>
-      <p:pic>
-        <p:nvPicPr>
-          <p:cNvPr id="7" name="Obrázek 6">
-            <a:extLst>
-              <a:ext uri="{FF2B5EF4-FFF2-40B4-BE49-F238E27FC236}">
-                <a16:creationId xmlns:a16="http://schemas.microsoft.com/office/drawing/2014/main" id="{BBD126C9-A16C-42F6-88D3-3BD9144CCDF4}"/>
-              </a:ext>
-            </a:extLst>
-          </p:cNvPr>
-          <p:cNvPicPr>
-            <a:picLocks noChangeAspect="1"/>
-          </p:cNvPicPr>
-          <p:nvPr/>
-        </p:nvPicPr>
-        <p:blipFill>
-          <a:blip r:embed="rId2"/>
-          <a:stretch>
-            <a:fillRect/>
-          </a:stretch>
-        </p:blipFill>
-        <p:spPr>
-          <a:xfrm>
-            <a:off x="3256456" y="2636912"/>
-            <a:ext cx="1503591" cy="3410205"/>
-          </a:xfrm>
-          <a:prstGeom prst="rect">
-            <a:avLst/>
-          </a:prstGeom>
-        </p:spPr>
-      </p:pic>
-      <p:pic>
-        <p:nvPicPr>
-          <p:cNvPr id="9" name="Obrázek 8">
-            <a:extLst>
-              <a:ext uri="{FF2B5EF4-FFF2-40B4-BE49-F238E27FC236}">
-                <a16:creationId xmlns:a16="http://schemas.microsoft.com/office/drawing/2014/main" id="{60A47F84-3A15-4087-8650-1DB164A91D4F}"/>
-              </a:ext>
-            </a:extLst>
-          </p:cNvPr>
-          <p:cNvPicPr>
-            <a:picLocks noChangeAspect="1"/>
-          </p:cNvPicPr>
-          <p:nvPr/>
-        </p:nvPicPr>
-        <p:blipFill>
-          <a:blip r:embed="rId3"/>
-          <a:stretch>
-            <a:fillRect/>
-          </a:stretch>
-        </p:blipFill>
-        <p:spPr>
-          <a:xfrm>
-            <a:off x="7414771" y="2638810"/>
-            <a:ext cx="1553458" cy="3487354"/>
-          </a:xfrm>
-          <a:prstGeom prst="rect">
-            <a:avLst/>
-          </a:prstGeom>
-        </p:spPr>
-      </p:pic>
-    </p:spTree>
-    <p:extLst>
-      <p:ext uri="{BB962C8B-B14F-4D97-AF65-F5344CB8AC3E}">
-        <p14:creationId xmlns:p14="http://schemas.microsoft.com/office/powerpoint/2010/main" val="1824929657"/>
-      </p:ext>
-    </p:extLst>
-  </p:cSld>
-  <p:clrMapOvr>
-    <a:masterClrMapping/>
-  </p:clrMapOvr>
-  <p:timing>
-    <p:tnLst>
-      <p:par>
-        <p:cTn id="1" dur="indefinite" restart="never" nodeType="tmRoot">
-          <p:childTnLst>
-            <p:seq concurrent="1" nextAc="seek">
-              <p:cTn id="2" dur="indefinite" nodeType="mainSeq">
-                <p:childTnLst>
-                  <p:par>
-                    <p:cTn id="3" fill="hold">
-                      <p:stCondLst>
-                        <p:cond delay="indefinite"/>
-                        <p:cond evt="onBegin" delay="0">
-                          <p:tn val="2"/>
-                        </p:cond>
-                      </p:stCondLst>
-                      <p:childTnLst>
-                        <p:par>
-                          <p:cTn id="4" fill="hold">
-                            <p:stCondLst>
-                              <p:cond delay="0"/>
-                            </p:stCondLst>
-                            <p:childTnLst>
-                              <p:par>
-                                <p:cTn id="5" presetID="1" presetClass="entr" presetSubtype="0" fill="hold" nodeType="withEffect">
-                                  <p:stCondLst>
-                                    <p:cond delay="0"/>
-                                  </p:stCondLst>
-                                  <p:childTnLst>
-                                    <p:set>
-                                      <p:cBhvr>
-                                        <p:cTn id="6" dur="1" fill="hold">
-                                          <p:stCondLst>
-                                            <p:cond delay="0"/>
-                                          </p:stCondLst>
-                                        </p:cTn>
-                                        <p:tgtEl>
-                                          <p:spTgt spid="7"/>
-                                        </p:tgtEl>
-                                        <p:attrNameLst>
-                                          <p:attrName>style.visibility</p:attrName>
-                                        </p:attrNameLst>
-                                      </p:cBhvr>
-                                      <p:to>
-                                        <p:strVal val="visible"/>
-                                      </p:to>
-                                    </p:set>
-                                  </p:childTnLst>
-                                </p:cTn>
-                              </p:par>
-                              <p:par>
-                                <p:cTn id="7" presetID="1" presetClass="entr" presetSubtype="0" fill="hold" grpId="0" nodeType="withEffect">
-                                  <p:stCondLst>
-                                    <p:cond delay="0"/>
-                                  </p:stCondLst>
-                                  <p:childTnLst>
-                                    <p:set>
-                                      <p:cBhvr>
-                                        <p:cTn id="8" dur="1" fill="hold">
-                                          <p:stCondLst>
-                                            <p:cond delay="0"/>
-                                          </p:stCondLst>
-                                        </p:cTn>
-                                        <p:tgtEl>
-                                          <p:spTgt spid="6">
-                                            <p:txEl>
-                                              <p:pRg st="0" end="0"/>
-                                            </p:txEl>
-                                          </p:spTgt>
-                                        </p:tgtEl>
-                                        <p:attrNameLst>
-                                          <p:attrName>style.visibility</p:attrName>
-                                        </p:attrNameLst>
-                                      </p:cBhvr>
-                                      <p:to>
-                                        <p:strVal val="visible"/>
-                                      </p:to>
-                                    </p:set>
-                                  </p:childTnLst>
-                                </p:cTn>
-                              </p:par>
-                              <p:par>
-                                <p:cTn id="9" presetID="1" presetClass="entr" presetSubtype="0" fill="hold" grpId="0" nodeType="withEffect">
-                                  <p:stCondLst>
-                                    <p:cond delay="0"/>
-                                  </p:stCondLst>
-                                  <p:childTnLst>
-                                    <p:set>
-                                      <p:cBhvr>
-                                        <p:cTn id="10" dur="1" fill="hold">
-                                          <p:stCondLst>
-                                            <p:cond delay="0"/>
-                                          </p:stCondLst>
-                                        </p:cTn>
-                                        <p:tgtEl>
-                                          <p:spTgt spid="6">
-                                            <p:txEl>
-                                              <p:pRg st="1" end="1"/>
-                                            </p:txEl>
-                                          </p:spTgt>
-                                        </p:tgtEl>
-                                        <p:attrNameLst>
-                                          <p:attrName>style.visibility</p:attrName>
-                                        </p:attrNameLst>
-                                      </p:cBhvr>
-                                      <p:to>
-                                        <p:strVal val="visible"/>
-                                      </p:to>
-                                    </p:set>
-                                  </p:childTnLst>
-                                </p:cTn>
-                              </p:par>
-                            </p:childTnLst>
-                          </p:cTn>
-                        </p:par>
-                      </p:childTnLst>
-                    </p:cTn>
-                  </p:par>
-                  <p:par>
-                    <p:cTn id="11" fill="hold">
-                      <p:stCondLst>
-                        <p:cond delay="indefinite"/>
-                      </p:stCondLst>
-                      <p:childTnLst>
-                        <p:par>
-                          <p:cTn id="12" fill="hold">
-                            <p:stCondLst>
-                              <p:cond delay="0"/>
-                            </p:stCondLst>
-                            <p:childTnLst>
-                              <p:par>
-                                <p:cTn id="13" presetID="1" presetClass="entr" presetSubtype="0" fill="hold" grpId="0" nodeType="clickEffect">
-                                  <p:stCondLst>
-                                    <p:cond delay="0"/>
-                                  </p:stCondLst>
-                                  <p:childTnLst>
-                                    <p:set>
-                                      <p:cBhvr>
-                                        <p:cTn id="14" dur="1" fill="hold">
-                                          <p:stCondLst>
-                                            <p:cond delay="0"/>
-                                          </p:stCondLst>
-                                        </p:cTn>
-                                        <p:tgtEl>
-                                          <p:spTgt spid="5">
-                                            <p:txEl>
-                                              <p:pRg st="0" end="0"/>
-                                            </p:txEl>
-                                          </p:spTgt>
-                                        </p:tgtEl>
-                                        <p:attrNameLst>
-                                          <p:attrName>style.visibility</p:attrName>
-                                        </p:attrNameLst>
-                                      </p:cBhvr>
-                                      <p:to>
-                                        <p:strVal val="visible"/>
-                                      </p:to>
-                                    </p:set>
-                                  </p:childTnLst>
-                                </p:cTn>
-                              </p:par>
-                              <p:par>
-                                <p:cTn id="15" presetID="1" presetClass="entr" presetSubtype="0" fill="hold" grpId="0" nodeType="withEffect">
-                                  <p:stCondLst>
-                                    <p:cond delay="0"/>
-                                  </p:stCondLst>
-                                  <p:childTnLst>
-                                    <p:set>
-                                      <p:cBhvr>
-                                        <p:cTn id="16" dur="1" fill="hold">
-                                          <p:stCondLst>
-                                            <p:cond delay="0"/>
-                                          </p:stCondLst>
-                                        </p:cTn>
-                                        <p:tgtEl>
-                                          <p:spTgt spid="5">
-                                            <p:txEl>
-                                              <p:pRg st="1" end="1"/>
-                                            </p:txEl>
-                                          </p:spTgt>
-                                        </p:tgtEl>
-                                        <p:attrNameLst>
-                                          <p:attrName>style.visibility</p:attrName>
-                                        </p:attrNameLst>
-                                      </p:cBhvr>
-                                      <p:to>
-                                        <p:strVal val="visible"/>
-                                      </p:to>
-                                    </p:set>
-                                  </p:childTnLst>
-                                </p:cTn>
-                              </p:par>
-                              <p:par>
-                                <p:cTn id="17" presetID="1" presetClass="entr" presetSubtype="0" fill="hold" nodeType="withEffect">
-                                  <p:stCondLst>
-                                    <p:cond delay="0"/>
-                                  </p:stCondLst>
-                                  <p:childTnLst>
-                                    <p:set>
-                                      <p:cBhvr>
-                                        <p:cTn id="18" dur="1" fill="hold">
-                                          <p:stCondLst>
-                                            <p:cond delay="0"/>
-                                          </p:stCondLst>
-                                        </p:cTn>
-                                        <p:tgtEl>
-                                          <p:spTgt spid="9"/>
-                                        </p:tgtEl>
-                                        <p:attrNameLst>
-                                          <p:attrName>style.visibility</p:attrName>
-                                        </p:attrNameLst>
-                                      </p:cBhvr>
-                                      <p:to>
-                                        <p:strVal val="visible"/>
-                                      </p:to>
-                                    </p:set>
-                                  </p:childTnLst>
-                                </p:cTn>
-                              </p:par>
-                            </p:childTnLst>
-                          </p:cTn>
-                        </p:par>
-                      </p:childTnLst>
-                    </p:cTn>
-                  </p:par>
-                </p:childTnLst>
-              </p:cTn>
-              <p:prevCondLst>
-                <p:cond evt="onPrev" delay="0">
-                  <p:tgtEl>
-                    <p:sldTgt/>
-                  </p:tgtEl>
-                </p:cond>
-              </p:prevCondLst>
-              <p:nextCondLst>
-                <p:cond evt="onNext" delay="0">
-                  <p:tgtEl>
-                    <p:sldTgt/>
-                  </p:tgtEl>
-                </p:cond>
-              </p:nextCondLst>
-            </p:seq>
-          </p:childTnLst>
-        </p:cTn>
-      </p:par>
-    </p:tnLst>
-    <p:bldLst>
-      <p:bldP spid="5" grpId="0" uiExpand="1" build="p"/>
-      <p:bldP spid="6" grpId="0" uiExpand="1" build="p"/>
-    </p:bldLst>
-  </p:timing>
-</p:sld>
-</file>
-
-<file path=ppt/slides/slide20.xml><?xml version="1.0" encoding="utf-8"?>
-<p:sld xmlns:a="http://schemas.openxmlformats.org/drawingml/2006/main" xmlns:r="http://schemas.openxmlformats.org/officeDocument/2006/relationships" xmlns:p="http://schemas.openxmlformats.org/presentationml/2006/main">
-  <p:cSld>
-    <p:spTree>
-      <p:nvGrpSpPr>
-        <p:cNvPr id="1" name=""/>
-        <p:cNvGrpSpPr/>
-        <p:nvPr/>
-      </p:nvGrpSpPr>
-      <p:grpSpPr>
-        <a:xfrm>
-          <a:off x="0" y="0"/>
-          <a:ext cx="0" cy="0"/>
-          <a:chOff x="0" y="0"/>
-          <a:chExt cx="0" cy="0"/>
-        </a:xfrm>
-      </p:grpSpPr>
-      <p:sp>
-        <p:nvSpPr>
-          <p:cNvPr id="2" name="Nadpis 1">
-            <a:extLst>
-              <a:ext uri="{FF2B5EF4-FFF2-40B4-BE49-F238E27FC236}">
-                <a16:creationId xmlns:a16="http://schemas.microsoft.com/office/drawing/2014/main" id="{215290C2-7187-4C20-921A-A6B0C66F2A28}"/>
-              </a:ext>
-            </a:extLst>
-          </p:cNvPr>
-          <p:cNvSpPr>
-            <a:spLocks noGrp="1"/>
-          </p:cNvSpPr>
-          <p:nvPr>
-            <p:ph type="title"/>
-          </p:nvPr>
-        </p:nvSpPr>
-        <p:spPr/>
-        <p:txBody>
-          <a:bodyPr/>
-          <a:lstStyle/>
-          <a:p>
-            <a:pPr algn="l"/>
-            <a:r>
-              <a:rPr lang="en-US" dirty="0" err="1"/>
-              <a:t>Str</a:t>
-            </a:r>
-            <a:r>
-              <a:rPr lang="sk-SK" dirty="0" err="1"/>
-              <a:t>ánky</a:t>
-            </a:r>
-            <a:endParaRPr lang="en-US" dirty="0"/>
-          </a:p>
-        </p:txBody>
-      </p:sp>
-      <p:sp>
-        <p:nvSpPr>
-          <p:cNvPr id="3" name="Zástupný symbol pro obsah 2">
-            <a:extLst>
-              <a:ext uri="{FF2B5EF4-FFF2-40B4-BE49-F238E27FC236}">
-                <a16:creationId xmlns:a16="http://schemas.microsoft.com/office/drawing/2014/main" id="{1050AA33-E6BB-4822-AF21-FCE8791CC567}"/>
-              </a:ext>
-            </a:extLst>
-          </p:cNvPr>
-          <p:cNvSpPr>
-            <a:spLocks noGrp="1"/>
-          </p:cNvSpPr>
-          <p:nvPr>
-            <p:ph sz="half" idx="1"/>
-          </p:nvPr>
-        </p:nvSpPr>
-        <p:spPr/>
-        <p:txBody>
-          <a:bodyPr/>
-          <a:lstStyle/>
-          <a:p>
-            <a:r>
-              <a:rPr lang="cs-CZ" b="1" dirty="0" err="1"/>
-              <a:t>TabbedPage</a:t>
-            </a:r>
-            <a:endParaRPr lang="cs-CZ" b="1" dirty="0"/>
-          </a:p>
-          <a:p>
-            <a:pPr marL="0" indent="0" algn="ctr">
-              <a:buNone/>
-            </a:pPr>
-            <a:r>
-              <a:rPr lang="cs-CZ" dirty="0"/>
-              <a:t>Záložky</a:t>
-            </a:r>
-          </a:p>
-        </p:txBody>
-      </p:sp>
-      <p:sp>
-        <p:nvSpPr>
-          <p:cNvPr id="4" name="Zástupný symbol pro obsah 3">
-            <a:extLst>
-              <a:ext uri="{FF2B5EF4-FFF2-40B4-BE49-F238E27FC236}">
-                <a16:creationId xmlns:a16="http://schemas.microsoft.com/office/drawing/2014/main" id="{BACFFD27-B139-492E-9BE3-53E06DA57764}"/>
-              </a:ext>
-            </a:extLst>
-          </p:cNvPr>
-          <p:cNvSpPr>
-            <a:spLocks noGrp="1"/>
-          </p:cNvSpPr>
-          <p:nvPr>
-            <p:ph sz="half" idx="2"/>
-          </p:nvPr>
-        </p:nvSpPr>
-        <p:spPr/>
-        <p:txBody>
-          <a:bodyPr/>
-          <a:lstStyle/>
-          <a:p>
-            <a:r>
-              <a:rPr lang="cs-CZ" b="1" dirty="0" err="1"/>
-              <a:t>CarouselPage</a:t>
-            </a:r>
-            <a:endParaRPr lang="cs-CZ" b="1" dirty="0"/>
-          </a:p>
-          <a:p>
-            <a:pPr marL="0" indent="0" algn="ctr">
-              <a:buNone/>
-            </a:pPr>
-            <a:r>
-              <a:rPr lang="cs-CZ" dirty="0"/>
-              <a:t>Stránky vedle sebe</a:t>
-            </a:r>
-          </a:p>
-          <a:p>
-            <a:pPr marL="457200" lvl="1" indent="0">
-              <a:buNone/>
-            </a:pPr>
-            <a:endParaRPr lang="cs-CZ" b="1" dirty="0"/>
-          </a:p>
-        </p:txBody>
-      </p:sp>
-      <p:pic>
-        <p:nvPicPr>
-          <p:cNvPr id="6" name="Obrázek 5">
-            <a:extLst>
-              <a:ext uri="{FF2B5EF4-FFF2-40B4-BE49-F238E27FC236}">
-                <a16:creationId xmlns:a16="http://schemas.microsoft.com/office/drawing/2014/main" id="{4F4DBBEC-0966-47FE-9A25-8D9AB7D05F9B}"/>
-              </a:ext>
-            </a:extLst>
-          </p:cNvPr>
-          <p:cNvPicPr>
-            <a:picLocks noChangeAspect="1"/>
-          </p:cNvPicPr>
-          <p:nvPr/>
-        </p:nvPicPr>
-        <p:blipFill>
-          <a:blip r:embed="rId2"/>
-          <a:stretch>
-            <a:fillRect/>
-          </a:stretch>
-        </p:blipFill>
-        <p:spPr>
-          <a:xfrm>
-            <a:off x="3149416" y="3303719"/>
-            <a:ext cx="1702169" cy="3404336"/>
-          </a:xfrm>
-          <a:prstGeom prst="rect">
-            <a:avLst/>
-          </a:prstGeom>
-        </p:spPr>
-      </p:pic>
-      <p:pic>
-        <p:nvPicPr>
-          <p:cNvPr id="7" name="Obrázek 6">
-            <a:extLst>
-              <a:ext uri="{FF2B5EF4-FFF2-40B4-BE49-F238E27FC236}">
-                <a16:creationId xmlns:a16="http://schemas.microsoft.com/office/drawing/2014/main" id="{95C14B65-AE39-4089-A1A7-654BA50F1202}"/>
-              </a:ext>
-            </a:extLst>
-          </p:cNvPr>
-          <p:cNvPicPr>
-            <a:picLocks noChangeAspect="1"/>
-          </p:cNvPicPr>
-          <p:nvPr/>
-        </p:nvPicPr>
-        <p:blipFill>
-          <a:blip r:embed="rId3"/>
-          <a:stretch>
-            <a:fillRect/>
-          </a:stretch>
-        </p:blipFill>
-        <p:spPr>
-          <a:xfrm>
-            <a:off x="7330284" y="3291960"/>
-            <a:ext cx="1722432" cy="3404336"/>
-          </a:xfrm>
-          <a:prstGeom prst="rect">
-            <a:avLst/>
-          </a:prstGeom>
-        </p:spPr>
-      </p:pic>
-    </p:spTree>
-    <p:extLst>
-      <p:ext uri="{BB962C8B-B14F-4D97-AF65-F5344CB8AC3E}">
-        <p14:creationId xmlns:p14="http://schemas.microsoft.com/office/powerpoint/2010/main" val="1724586541"/>
-      </p:ext>
-    </p:extLst>
-  </p:cSld>
-  <p:clrMapOvr>
-    <a:masterClrMapping/>
-  </p:clrMapOvr>
-  <p:timing>
-    <p:tnLst>
-      <p:par>
-        <p:cTn id="1" dur="indefinite" restart="never" nodeType="tmRoot">
-          <p:childTnLst>
-            <p:seq concurrent="1" nextAc="seek">
-              <p:cTn id="2" dur="indefinite" nodeType="mainSeq">
-                <p:childTnLst>
-                  <p:par>
-                    <p:cTn id="3" fill="hold">
-                      <p:stCondLst>
-                        <p:cond delay="indefinite"/>
-                        <p:cond evt="onBegin" delay="0">
-                          <p:tn val="2"/>
-                        </p:cond>
-                      </p:stCondLst>
-                      <p:childTnLst>
-                        <p:par>
-                          <p:cTn id="4" fill="hold">
-                            <p:stCondLst>
-                              <p:cond delay="0"/>
-                            </p:stCondLst>
-                            <p:childTnLst>
-                              <p:par>
-                                <p:cTn id="5" presetID="1" presetClass="entr" presetSubtype="0" fill="hold" nodeType="withEffect">
-                                  <p:stCondLst>
-                                    <p:cond delay="0"/>
-                                  </p:stCondLst>
-                                  <p:childTnLst>
-                                    <p:set>
-                                      <p:cBhvr>
-                                        <p:cTn id="6" dur="1" fill="hold">
-                                          <p:stCondLst>
-                                            <p:cond delay="0"/>
-                                          </p:stCondLst>
-                                        </p:cTn>
-                                        <p:tgtEl>
-                                          <p:spTgt spid="6"/>
-                                        </p:tgtEl>
-                                        <p:attrNameLst>
-                                          <p:attrName>style.visibility</p:attrName>
-                                        </p:attrNameLst>
-                                      </p:cBhvr>
-                                      <p:to>
-                                        <p:strVal val="visible"/>
-                                      </p:to>
-                                    </p:set>
-                                  </p:childTnLst>
-                                </p:cTn>
-                              </p:par>
-                              <p:par>
-                                <p:cTn id="7" presetID="1" presetClass="entr" presetSubtype="0" fill="hold" grpId="0" nodeType="withEffect">
-                                  <p:stCondLst>
-                                    <p:cond delay="0"/>
-                                  </p:stCondLst>
-                                  <p:childTnLst>
-                                    <p:set>
-                                      <p:cBhvr>
-                                        <p:cTn id="8" dur="1" fill="hold">
-                                          <p:stCondLst>
-                                            <p:cond delay="0"/>
-                                          </p:stCondLst>
-                                        </p:cTn>
-                                        <p:tgtEl>
-                                          <p:spTgt spid="3">
-                                            <p:txEl>
-                                              <p:pRg st="0" end="0"/>
-                                            </p:txEl>
-                                          </p:spTgt>
-                                        </p:tgtEl>
-                                        <p:attrNameLst>
-                                          <p:attrName>style.visibility</p:attrName>
-                                        </p:attrNameLst>
-                                      </p:cBhvr>
-                                      <p:to>
-                                        <p:strVal val="visible"/>
-                                      </p:to>
-                                    </p:set>
-                                  </p:childTnLst>
-                                </p:cTn>
-                              </p:par>
-                              <p:par>
-                                <p:cTn id="9" presetID="1" presetClass="entr" presetSubtype="0" fill="hold" grpId="0" nodeType="withEffect">
-                                  <p:stCondLst>
-                                    <p:cond delay="0"/>
-                                  </p:stCondLst>
-                                  <p:childTnLst>
-                                    <p:set>
-                                      <p:cBhvr>
-                                        <p:cTn id="10" dur="1" fill="hold">
-                                          <p:stCondLst>
-                                            <p:cond delay="0"/>
-                                          </p:stCondLst>
-                                        </p:cTn>
-                                        <p:tgtEl>
-                                          <p:spTgt spid="3">
-                                            <p:txEl>
-                                              <p:pRg st="1" end="1"/>
-                                            </p:txEl>
-                                          </p:spTgt>
-                                        </p:tgtEl>
-                                        <p:attrNameLst>
-                                          <p:attrName>style.visibility</p:attrName>
-                                        </p:attrNameLst>
-                                      </p:cBhvr>
-                                      <p:to>
-                                        <p:strVal val="visible"/>
-                                      </p:to>
-                                    </p:set>
-                                  </p:childTnLst>
-                                </p:cTn>
-                              </p:par>
-                            </p:childTnLst>
-                          </p:cTn>
-                        </p:par>
-                      </p:childTnLst>
-                    </p:cTn>
-                  </p:par>
-                  <p:par>
-                    <p:cTn id="11" fill="hold">
-                      <p:stCondLst>
-                        <p:cond delay="indefinite"/>
-                      </p:stCondLst>
-                      <p:childTnLst>
-                        <p:par>
-                          <p:cTn id="12" fill="hold">
-                            <p:stCondLst>
-                              <p:cond delay="0"/>
-                            </p:stCondLst>
-                            <p:childTnLst>
-                              <p:par>
-                                <p:cTn id="13" presetID="1" presetClass="entr" presetSubtype="0" fill="hold" grpId="0" nodeType="clickEffect">
-                                  <p:stCondLst>
-                                    <p:cond delay="0"/>
-                                  </p:stCondLst>
-                                  <p:childTnLst>
-                                    <p:set>
-                                      <p:cBhvr>
-                                        <p:cTn id="14" dur="1" fill="hold">
-                                          <p:stCondLst>
-                                            <p:cond delay="0"/>
-                                          </p:stCondLst>
-                                        </p:cTn>
-                                        <p:tgtEl>
-                                          <p:spTgt spid="4">
-                                            <p:txEl>
-                                              <p:pRg st="0" end="0"/>
-                                            </p:txEl>
-                                          </p:spTgt>
-                                        </p:tgtEl>
-                                        <p:attrNameLst>
-                                          <p:attrName>style.visibility</p:attrName>
-                                        </p:attrNameLst>
-                                      </p:cBhvr>
-                                      <p:to>
-                                        <p:strVal val="visible"/>
-                                      </p:to>
-                                    </p:set>
-                                  </p:childTnLst>
-                                </p:cTn>
-                              </p:par>
-                              <p:par>
-                                <p:cTn id="15" presetID="1" presetClass="entr" presetSubtype="0" fill="hold" grpId="0" nodeType="withEffect">
-                                  <p:stCondLst>
-                                    <p:cond delay="0"/>
-                                  </p:stCondLst>
-                                  <p:childTnLst>
-                                    <p:set>
-                                      <p:cBhvr>
-                                        <p:cTn id="16" dur="1" fill="hold">
-                                          <p:stCondLst>
-                                            <p:cond delay="0"/>
-                                          </p:stCondLst>
-                                        </p:cTn>
-                                        <p:tgtEl>
-                                          <p:spTgt spid="4">
-                                            <p:txEl>
-                                              <p:pRg st="1" end="1"/>
-                                            </p:txEl>
-                                          </p:spTgt>
-                                        </p:tgtEl>
-                                        <p:attrNameLst>
-                                          <p:attrName>style.visibility</p:attrName>
-                                        </p:attrNameLst>
-                                      </p:cBhvr>
-                                      <p:to>
-                                        <p:strVal val="visible"/>
-                                      </p:to>
-                                    </p:set>
-                                  </p:childTnLst>
-                                </p:cTn>
-                              </p:par>
-                              <p:par>
-                                <p:cTn id="17" presetID="1" presetClass="entr" presetSubtype="0" fill="hold" nodeType="withEffect">
-                                  <p:stCondLst>
-                                    <p:cond delay="0"/>
-                                  </p:stCondLst>
-                                  <p:childTnLst>
-                                    <p:set>
-                                      <p:cBhvr>
-                                        <p:cTn id="18" dur="1" fill="hold">
-                                          <p:stCondLst>
-                                            <p:cond delay="0"/>
-                                          </p:stCondLst>
-                                        </p:cTn>
-                                        <p:tgtEl>
-                                          <p:spTgt spid="7"/>
-                                        </p:tgtEl>
-                                        <p:attrNameLst>
-                                          <p:attrName>style.visibility</p:attrName>
-                                        </p:attrNameLst>
-                                      </p:cBhvr>
-                                      <p:to>
-                                        <p:strVal val="visible"/>
-                                      </p:to>
-                                    </p:set>
-                                  </p:childTnLst>
-                                </p:cTn>
-                              </p:par>
-                            </p:childTnLst>
-                          </p:cTn>
-                        </p:par>
-                      </p:childTnLst>
-                    </p:cTn>
-                  </p:par>
-                </p:childTnLst>
-              </p:cTn>
-              <p:prevCondLst>
-                <p:cond evt="onPrev" delay="0">
-                  <p:tgtEl>
-                    <p:sldTgt/>
-                  </p:tgtEl>
-                </p:cond>
-              </p:prevCondLst>
-              <p:nextCondLst>
-                <p:cond evt="onNext" delay="0">
-                  <p:tgtEl>
-                    <p:sldTgt/>
-                  </p:tgtEl>
-                </p:cond>
-              </p:nextCondLst>
-            </p:seq>
-          </p:childTnLst>
-        </p:cTn>
-      </p:par>
-    </p:tnLst>
-    <p:bldLst>
-      <p:bldP spid="3" grpId="0" uiExpand="1" build="p"/>
-      <p:bldP spid="4" grpId="0" uiExpand="1" build="p"/>
-    </p:bldLst>
-  </p:timing>
-</p:sld>
-</file>
-
-<file path=ppt/slides/slide21.xml><?xml version="1.0" encoding="utf-8"?>
-<p:sld xmlns:a="http://schemas.openxmlformats.org/drawingml/2006/main" xmlns:r="http://schemas.openxmlformats.org/officeDocument/2006/relationships" xmlns:p="http://schemas.openxmlformats.org/presentationml/2006/main">
-  <p:cSld>
-    <p:spTree>
-      <p:nvGrpSpPr>
-        <p:cNvPr id="1" name=""/>
-        <p:cNvGrpSpPr/>
-        <p:nvPr/>
-      </p:nvGrpSpPr>
-      <p:grpSpPr>
-        <a:xfrm>
-          <a:off x="0" y="0"/>
-          <a:ext cx="0" cy="0"/>
-          <a:chOff x="0" y="0"/>
-          <a:chExt cx="0" cy="0"/>
-        </a:xfrm>
-      </p:grpSpPr>
-      <p:sp>
-        <p:nvSpPr>
-          <p:cNvPr id="2" name="Nadpis 1">
-            <a:extLst>
-              <a:ext uri="{FF2B5EF4-FFF2-40B4-BE49-F238E27FC236}">
-                <a16:creationId xmlns:a16="http://schemas.microsoft.com/office/drawing/2014/main" id="{550CFA12-9CEB-4BDF-8E50-7CF4378BB972}"/>
-              </a:ext>
-            </a:extLst>
-          </p:cNvPr>
-          <p:cNvSpPr>
-            <a:spLocks noGrp="1"/>
-          </p:cNvSpPr>
-          <p:nvPr>
-            <p:ph type="title"/>
-          </p:nvPr>
-        </p:nvSpPr>
-        <p:spPr/>
-        <p:txBody>
-          <a:bodyPr/>
-          <a:lstStyle/>
-          <a:p>
-            <a:pPr algn="l"/>
-            <a:r>
-              <a:rPr lang="en-US" dirty="0" err="1"/>
-              <a:t>Str</a:t>
-            </a:r>
-            <a:r>
-              <a:rPr lang="sk-SK" dirty="0" err="1"/>
-              <a:t>ánky</a:t>
-            </a:r>
-            <a:endParaRPr lang="en-US" dirty="0"/>
-          </a:p>
-        </p:txBody>
-      </p:sp>
-      <p:sp>
-        <p:nvSpPr>
-          <p:cNvPr id="3" name="Zástupný symbol pro obsah 2">
-            <a:extLst>
-              <a:ext uri="{FF2B5EF4-FFF2-40B4-BE49-F238E27FC236}">
-                <a16:creationId xmlns:a16="http://schemas.microsoft.com/office/drawing/2014/main" id="{E87F5508-0A24-425C-8E1B-9B4DA4F26DD6}"/>
-              </a:ext>
-            </a:extLst>
-          </p:cNvPr>
-          <p:cNvSpPr>
-            <a:spLocks noGrp="1"/>
-          </p:cNvSpPr>
-          <p:nvPr>
-            <p:ph sz="half" idx="1"/>
-          </p:nvPr>
-        </p:nvSpPr>
-        <p:spPr/>
-        <p:txBody>
-          <a:bodyPr/>
-          <a:lstStyle/>
-          <a:p>
-            <a:r>
-              <a:rPr lang="cs-CZ" b="1" dirty="0" err="1"/>
-              <a:t>NavigationPage</a:t>
-            </a:r>
-            <a:endParaRPr lang="cs-CZ" b="1" dirty="0"/>
-          </a:p>
-          <a:p>
-            <a:pPr marL="0" indent="0" algn="ctr">
-              <a:buNone/>
-            </a:pPr>
-            <a:r>
-              <a:rPr lang="cs-CZ" dirty="0"/>
-              <a:t>Aby fungovala navigace</a:t>
-            </a:r>
-            <a:endParaRPr lang="cs-CZ" b="1" dirty="0"/>
-          </a:p>
-        </p:txBody>
-      </p:sp>
-      <p:sp>
-        <p:nvSpPr>
-          <p:cNvPr id="4" name="Zástupný symbol pro obsah 3">
-            <a:extLst>
-              <a:ext uri="{FF2B5EF4-FFF2-40B4-BE49-F238E27FC236}">
-                <a16:creationId xmlns:a16="http://schemas.microsoft.com/office/drawing/2014/main" id="{BCAA762F-337E-4314-97B1-49B07E4D94A8}"/>
-              </a:ext>
-            </a:extLst>
-          </p:cNvPr>
-          <p:cNvSpPr>
-            <a:spLocks noGrp="1"/>
-          </p:cNvSpPr>
-          <p:nvPr>
-            <p:ph sz="half" idx="2"/>
-          </p:nvPr>
-        </p:nvSpPr>
-        <p:spPr/>
-        <p:txBody>
-          <a:bodyPr/>
-          <a:lstStyle/>
-          <a:p>
-            <a:r>
-              <a:rPr lang="cs-CZ" b="1" dirty="0" err="1"/>
-              <a:t>TemplatedPage</a:t>
-            </a:r>
-            <a:endParaRPr lang="cs-CZ" b="1" dirty="0"/>
-          </a:p>
-          <a:p>
-            <a:pPr marL="0" indent="0" algn="ctr">
-              <a:buNone/>
-            </a:pPr>
-            <a:r>
-              <a:rPr lang="cs-CZ" dirty="0"/>
-              <a:t>Prázdná stránka, bázová třída pro ostatní</a:t>
-            </a:r>
-          </a:p>
-        </p:txBody>
-      </p:sp>
-      <p:pic>
-        <p:nvPicPr>
-          <p:cNvPr id="6" name="Obrázek 4">
-            <a:extLst>
-              <a:ext uri="{FF2B5EF4-FFF2-40B4-BE49-F238E27FC236}">
-                <a16:creationId xmlns:a16="http://schemas.microsoft.com/office/drawing/2014/main" id="{0DE02F59-F8AC-4297-AAE2-1BF74DB984BA}"/>
-              </a:ext>
-            </a:extLst>
-          </p:cNvPr>
-          <p:cNvPicPr>
-            <a:picLocks noChangeAspect="1"/>
-          </p:cNvPicPr>
-          <p:nvPr/>
-        </p:nvPicPr>
-        <p:blipFill>
-          <a:blip r:embed="rId2"/>
-          <a:stretch>
-            <a:fillRect/>
-          </a:stretch>
-        </p:blipFill>
-        <p:spPr>
-          <a:xfrm>
-            <a:off x="3187144" y="3134140"/>
-            <a:ext cx="1626711" cy="3416095"/>
-          </a:xfrm>
-          <a:prstGeom prst="rect">
-            <a:avLst/>
-          </a:prstGeom>
-        </p:spPr>
-      </p:pic>
-    </p:spTree>
-    <p:extLst>
-      <p:ext uri="{BB962C8B-B14F-4D97-AF65-F5344CB8AC3E}">
-        <p14:creationId xmlns:p14="http://schemas.microsoft.com/office/powerpoint/2010/main" val="3308887364"/>
-      </p:ext>
-    </p:extLst>
-  </p:cSld>
-  <p:clrMapOvr>
-    <a:masterClrMapping/>
-  </p:clrMapOvr>
-  <p:timing>
-    <p:tnLst>
-      <p:par>
-        <p:cTn id="1" dur="indefinite" restart="never" nodeType="tmRoot">
-          <p:childTnLst>
-            <p:seq concurrent="1" nextAc="seek">
-              <p:cTn id="2" dur="indefinite" nodeType="mainSeq">
-                <p:childTnLst>
-                  <p:par>
-                    <p:cTn id="3" fill="hold">
-                      <p:stCondLst>
-                        <p:cond delay="indefinite"/>
-                        <p:cond evt="onBegin" delay="0">
-                          <p:tn val="2"/>
-                        </p:cond>
-                      </p:stCondLst>
-                      <p:childTnLst>
-                        <p:par>
-                          <p:cTn id="4" fill="hold">
-                            <p:stCondLst>
-                              <p:cond delay="0"/>
-                            </p:stCondLst>
-                            <p:childTnLst>
-                              <p:par>
-                                <p:cTn id="5" presetID="1" presetClass="entr" presetSubtype="0" fill="hold" grpId="0" nodeType="withEffect">
-                                  <p:stCondLst>
-                                    <p:cond delay="0"/>
-                                  </p:stCondLst>
-                                  <p:childTnLst>
-                                    <p:set>
-                                      <p:cBhvr>
-                                        <p:cTn id="6" dur="1" fill="hold">
-                                          <p:stCondLst>
-                                            <p:cond delay="0"/>
-                                          </p:stCondLst>
-                                        </p:cTn>
-                                        <p:tgtEl>
-                                          <p:spTgt spid="3">
-                                            <p:txEl>
-                                              <p:pRg st="0" end="0"/>
-                                            </p:txEl>
-                                          </p:spTgt>
-                                        </p:tgtEl>
-                                        <p:attrNameLst>
-                                          <p:attrName>style.visibility</p:attrName>
-                                        </p:attrNameLst>
-                                      </p:cBhvr>
-                                      <p:to>
-                                        <p:strVal val="visible"/>
-                                      </p:to>
-                                    </p:set>
-                                  </p:childTnLst>
-                                </p:cTn>
-                              </p:par>
-                              <p:par>
-                                <p:cTn id="7" presetID="1" presetClass="entr" presetSubtype="0" fill="hold" grpId="0" nodeType="withEffect">
-                                  <p:stCondLst>
-                                    <p:cond delay="0"/>
-                                  </p:stCondLst>
-                                  <p:childTnLst>
-                                    <p:set>
-                                      <p:cBhvr>
-                                        <p:cTn id="8" dur="1" fill="hold">
-                                          <p:stCondLst>
-                                            <p:cond delay="0"/>
-                                          </p:stCondLst>
-                                        </p:cTn>
-                                        <p:tgtEl>
-                                          <p:spTgt spid="3">
-                                            <p:txEl>
-                                              <p:pRg st="1" end="1"/>
-                                            </p:txEl>
-                                          </p:spTgt>
-                                        </p:tgtEl>
-                                        <p:attrNameLst>
-                                          <p:attrName>style.visibility</p:attrName>
-                                        </p:attrNameLst>
-                                      </p:cBhvr>
-                                      <p:to>
-                                        <p:strVal val="visible"/>
-                                      </p:to>
-                                    </p:set>
-                                  </p:childTnLst>
-                                </p:cTn>
-                              </p:par>
-                            </p:childTnLst>
-                          </p:cTn>
-                        </p:par>
-                      </p:childTnLst>
-                    </p:cTn>
-                  </p:par>
-                  <p:par>
-                    <p:cTn id="9" fill="hold">
-                      <p:stCondLst>
-                        <p:cond delay="indefinite"/>
-                      </p:stCondLst>
-                      <p:childTnLst>
-                        <p:par>
-                          <p:cTn id="10" fill="hold">
-                            <p:stCondLst>
-                              <p:cond delay="0"/>
-                            </p:stCondLst>
-                            <p:childTnLst>
-                              <p:par>
-                                <p:cTn id="11" presetID="1" presetClass="entr" presetSubtype="0" fill="hold" grpId="0" nodeType="clickEffect">
-                                  <p:stCondLst>
-                                    <p:cond delay="0"/>
-                                  </p:stCondLst>
-                                  <p:childTnLst>
-                                    <p:set>
-                                      <p:cBhvr>
-                                        <p:cTn id="12" dur="1" fill="hold">
-                                          <p:stCondLst>
-                                            <p:cond delay="0"/>
-                                          </p:stCondLst>
-                                        </p:cTn>
-                                        <p:tgtEl>
-                                          <p:spTgt spid="4">
-                                            <p:txEl>
-                                              <p:pRg st="0" end="0"/>
-                                            </p:txEl>
-                                          </p:spTgt>
-                                        </p:tgtEl>
-                                        <p:attrNameLst>
-                                          <p:attrName>style.visibility</p:attrName>
-                                        </p:attrNameLst>
-                                      </p:cBhvr>
-                                      <p:to>
-                                        <p:strVal val="visible"/>
-                                      </p:to>
-                                    </p:set>
-                                  </p:childTnLst>
-                                </p:cTn>
-                              </p:par>
-                              <p:par>
-                                <p:cTn id="13" presetID="1" presetClass="entr" presetSubtype="0" fill="hold" grpId="0" nodeType="withEffect">
-                                  <p:stCondLst>
-                                    <p:cond delay="0"/>
-                                  </p:stCondLst>
-                                  <p:childTnLst>
-                                    <p:set>
-                                      <p:cBhvr>
-                                        <p:cTn id="14" dur="1" fill="hold">
-                                          <p:stCondLst>
-                                            <p:cond delay="0"/>
-                                          </p:stCondLst>
-                                        </p:cTn>
-                                        <p:tgtEl>
-                                          <p:spTgt spid="4">
-                                            <p:txEl>
-                                              <p:pRg st="1" end="1"/>
-                                            </p:txEl>
-                                          </p:spTgt>
-                                        </p:tgtEl>
-                                        <p:attrNameLst>
-                                          <p:attrName>style.visibility</p:attrName>
-                                        </p:attrNameLst>
-                                      </p:cBhvr>
-                                      <p:to>
-                                        <p:strVal val="visible"/>
-                                      </p:to>
-                                    </p:set>
-                                  </p:childTnLst>
-                                </p:cTn>
-                              </p:par>
-                              <p:par>
-                                <p:cTn id="15" presetID="1" presetClass="entr" presetSubtype="0" fill="hold" nodeType="withEffect">
-                                  <p:stCondLst>
-                                    <p:cond delay="0"/>
-                                  </p:stCondLst>
-                                  <p:childTnLst>
-                                    <p:set>
-                                      <p:cBhvr>
-                                        <p:cTn id="16" dur="1" fill="hold">
-                                          <p:stCondLst>
-                                            <p:cond delay="0"/>
-                                          </p:stCondLst>
-                                        </p:cTn>
-                                        <p:tgtEl>
-                                          <p:spTgt spid="6"/>
-                                        </p:tgtEl>
-                                        <p:attrNameLst>
-                                          <p:attrName>style.visibility</p:attrName>
-                                        </p:attrNameLst>
-                                      </p:cBhvr>
-                                      <p:to>
-                                        <p:strVal val="visible"/>
-                                      </p:to>
-                                    </p:set>
-                                  </p:childTnLst>
-                                </p:cTn>
-                              </p:par>
-                            </p:childTnLst>
-                          </p:cTn>
-                        </p:par>
-                      </p:childTnLst>
-                    </p:cTn>
-                  </p:par>
-                </p:childTnLst>
-              </p:cTn>
-              <p:prevCondLst>
-                <p:cond evt="onPrev" delay="0">
-                  <p:tgtEl>
-                    <p:sldTgt/>
-                  </p:tgtEl>
-                </p:cond>
-              </p:prevCondLst>
-              <p:nextCondLst>
-                <p:cond evt="onNext" delay="0">
-                  <p:tgtEl>
-                    <p:sldTgt/>
-                  </p:tgtEl>
-                </p:cond>
-              </p:nextCondLst>
-            </p:seq>
-          </p:childTnLst>
-        </p:cTn>
-      </p:par>
-    </p:tnLst>
-    <p:bldLst>
-      <p:bldP spid="3" grpId="0" uiExpand="1" build="p"/>
-      <p:bldP spid="4" grpId="0" uiExpand="1" build="p"/>
-    </p:bldLst>
-  </p:timing>
-</p:sld>
-</file>
-
-<file path=ppt/slides/slide22.xml><?xml version="1.0" encoding="utf-8"?>
-<p:sld xmlns:a="http://schemas.openxmlformats.org/drawingml/2006/main" xmlns:r="http://schemas.openxmlformats.org/officeDocument/2006/relationships" xmlns:p="http://schemas.openxmlformats.org/presentationml/2006/main">
-  <p:cSld>
-    <p:spTree>
-      <p:nvGrpSpPr>
-        <p:cNvPr id="1" name=""/>
-        <p:cNvGrpSpPr/>
-        <p:nvPr/>
-      </p:nvGrpSpPr>
-      <p:grpSpPr>
-        <a:xfrm>
-          <a:off x="0" y="0"/>
-          <a:ext cx="0" cy="0"/>
-          <a:chOff x="0" y="0"/>
-          <a:chExt cx="0" cy="0"/>
-        </a:xfrm>
-      </p:grpSpPr>
-      <p:sp>
-        <p:nvSpPr>
-          <p:cNvPr id="7" name="Nadpis 6"/>
-          <p:cNvSpPr>
-            <a:spLocks noGrp="1"/>
-          </p:cNvSpPr>
-          <p:nvPr>
-            <p:ph type="title"/>
-          </p:nvPr>
-        </p:nvSpPr>
-        <p:spPr/>
-        <p:txBody>
-          <a:bodyPr/>
-          <a:lstStyle/>
-          <a:p>
-            <a:pPr algn="l"/>
-            <a:r>
-              <a:rPr lang="sk-SK" dirty="0"/>
-              <a:t>Stránky</a:t>
-            </a:r>
-          </a:p>
-        </p:txBody>
-      </p:sp>
-      <p:sp>
-        <p:nvSpPr>
-          <p:cNvPr id="2" name="Zástupný symbol pro obsah 1"/>
-          <p:cNvSpPr>
-            <a:spLocks noGrp="1"/>
-          </p:cNvSpPr>
-          <p:nvPr>
-            <p:ph idx="1"/>
-          </p:nvPr>
-        </p:nvSpPr>
-        <p:spPr>
-          <a:xfrm>
-            <a:off x="2135560" y="1700808"/>
-            <a:ext cx="8229600" cy="1152128"/>
-          </a:xfrm>
-        </p:spPr>
-        <p:txBody>
-          <a:bodyPr>
-            <a:normAutofit/>
-          </a:bodyPr>
-          <a:lstStyle/>
-          <a:p>
-            <a:r>
-              <a:rPr lang="cs-CZ" dirty="0"/>
-              <a:t>První, co se zobrazí, je v souboru </a:t>
-            </a:r>
-            <a:r>
-              <a:rPr lang="cs-CZ" dirty="0" err="1"/>
-              <a:t>App.cs</a:t>
-            </a:r>
-            <a:endParaRPr lang="cs-CZ" dirty="0"/>
-          </a:p>
-          <a:p>
-            <a:pPr lvl="1"/>
-            <a:r>
-              <a:rPr lang="cs-CZ" dirty="0"/>
-              <a:t>Defaultně </a:t>
-            </a:r>
-            <a:r>
-              <a:rPr lang="cs-CZ" dirty="0" err="1"/>
-              <a:t>MainPage</a:t>
-            </a:r>
-            <a:endParaRPr lang="cs-CZ" dirty="0"/>
-          </a:p>
-          <a:p>
-            <a:endParaRPr lang="sk-SK" dirty="0"/>
-          </a:p>
-        </p:txBody>
-      </p:sp>
-    </p:spTree>
-    <p:extLst>
-      <p:ext uri="{BB962C8B-B14F-4D97-AF65-F5344CB8AC3E}">
-        <p14:creationId xmlns:p14="http://schemas.microsoft.com/office/powerpoint/2010/main" val="1478045390"/>
-      </p:ext>
-    </p:extLst>
-  </p:cSld>
-  <p:clrMapOvr>
-    <a:masterClrMapping/>
-  </p:clrMapOvr>
-</p:sld>
-</file>
-
-<file path=ppt/slides/slide23.xml><?xml version="1.0" encoding="utf-8"?>
-<p:sld xmlns:a="http://schemas.openxmlformats.org/drawingml/2006/main" xmlns:r="http://schemas.openxmlformats.org/officeDocument/2006/relationships" xmlns:p="http://schemas.openxmlformats.org/presentationml/2006/main">
-  <p:cSld>
-    <p:spTree>
-      <p:nvGrpSpPr>
-        <p:cNvPr id="1" name=""/>
-        <p:cNvGrpSpPr/>
-        <p:nvPr/>
-      </p:nvGrpSpPr>
-      <p:grpSpPr>
-        <a:xfrm>
-          <a:off x="0" y="0"/>
-          <a:ext cx="0" cy="0"/>
-          <a:chOff x="0" y="0"/>
-          <a:chExt cx="0" cy="0"/>
-        </a:xfrm>
-      </p:grpSpPr>
-      <p:sp>
-        <p:nvSpPr>
           <p:cNvPr id="2" name="Title 1">
             <a:extLst>
               <a:ext uri="{FF2B5EF4-FFF2-40B4-BE49-F238E27FC236}">
@@ -35574,7 +32179,7 @@
 </p:sld>
 </file>
 
-<file path=ppt/slides/slide24.xml><?xml version="1.0" encoding="utf-8"?>
+<file path=ppt/slides/slide13.xml><?xml version="1.0" encoding="utf-8"?>
 <p:sld xmlns:a="http://schemas.openxmlformats.org/drawingml/2006/main" xmlns:r="http://schemas.openxmlformats.org/officeDocument/2006/relationships" xmlns:p="http://schemas.openxmlformats.org/presentationml/2006/main">
   <p:cSld>
     <p:spTree>
@@ -36061,7 +32666,7 @@
 </p:sld>
 </file>
 
-<file path=ppt/slides/slide25.xml><?xml version="1.0" encoding="utf-8"?>
+<file path=ppt/slides/slide14.xml><?xml version="1.0" encoding="utf-8"?>
 <p:sld xmlns:a="http://schemas.openxmlformats.org/drawingml/2006/main" xmlns:r="http://schemas.openxmlformats.org/officeDocument/2006/relationships" xmlns:p="http://schemas.openxmlformats.org/presentationml/2006/main">
   <p:cSld>
     <p:spTree>
@@ -36679,7 +33284,7 @@
 </p:sld>
 </file>
 
-<file path=ppt/slides/slide26.xml><?xml version="1.0" encoding="utf-8"?>
+<file path=ppt/slides/slide15.xml><?xml version="1.0" encoding="utf-8"?>
 <p:sld xmlns:a="http://schemas.openxmlformats.org/drawingml/2006/main" xmlns:r="http://schemas.openxmlformats.org/officeDocument/2006/relationships" xmlns:p="http://schemas.openxmlformats.org/presentationml/2006/main">
   <p:cSld>
     <p:spTree>
@@ -36841,7 +33446,7 @@
 </p:sld>
 </file>
 
-<file path=ppt/slides/slide27.xml><?xml version="1.0" encoding="utf-8"?>
+<file path=ppt/slides/slide16.xml><?xml version="1.0" encoding="utf-8"?>
 <p:sld xmlns:a="http://schemas.openxmlformats.org/drawingml/2006/main" xmlns:r="http://schemas.openxmlformats.org/officeDocument/2006/relationships" xmlns:p="http://schemas.openxmlformats.org/presentationml/2006/main">
   <p:cSld>
     <p:spTree>
@@ -37479,7 +34084,7 @@
 </p:sld>
 </file>
 
-<file path=ppt/slides/slide28.xml><?xml version="1.0" encoding="utf-8"?>
+<file path=ppt/slides/slide17.xml><?xml version="1.0" encoding="utf-8"?>
 <p:sld xmlns:a="http://schemas.openxmlformats.org/drawingml/2006/main" xmlns:r="http://schemas.openxmlformats.org/officeDocument/2006/relationships" xmlns:p="http://schemas.openxmlformats.org/presentationml/2006/main">
   <p:cSld>
     <p:spTree>
@@ -37963,6 +34568,508 @@
     </p:tnLst>
     <p:bldLst>
       <p:bldP spid="3" grpId="0" build="p"/>
+    </p:bldLst>
+  </p:timing>
+</p:sld>
+</file>
+
+<file path=ppt/slides/slide2.xml><?xml version="1.0" encoding="utf-8"?>
+<p:sld xmlns:a="http://schemas.openxmlformats.org/drawingml/2006/main" xmlns:r="http://schemas.openxmlformats.org/officeDocument/2006/relationships" xmlns:p="http://schemas.openxmlformats.org/presentationml/2006/main">
+  <p:cSld>
+    <p:spTree>
+      <p:nvGrpSpPr>
+        <p:cNvPr id="1" name=""/>
+        <p:cNvGrpSpPr/>
+        <p:nvPr/>
+      </p:nvGrpSpPr>
+      <p:grpSpPr>
+        <a:xfrm>
+          <a:off x="0" y="0"/>
+          <a:ext cx="0" cy="0"/>
+          <a:chOff x="0" y="0"/>
+          <a:chExt cx="0" cy="0"/>
+        </a:xfrm>
+      </p:grpSpPr>
+      <p:sp>
+        <p:nvSpPr>
+          <p:cNvPr id="4" name="Nadpis 3">
+            <a:extLst>
+              <a:ext uri="{FF2B5EF4-FFF2-40B4-BE49-F238E27FC236}">
+                <a16:creationId xmlns:a16="http://schemas.microsoft.com/office/drawing/2014/main" id="{A2FB38B9-C873-497B-8279-2D1A98BA8650}"/>
+              </a:ext>
+            </a:extLst>
+          </p:cNvPr>
+          <p:cNvSpPr>
+            <a:spLocks noGrp="1"/>
+          </p:cNvSpPr>
+          <p:nvPr>
+            <p:ph type="title"/>
+          </p:nvPr>
+        </p:nvSpPr>
+        <p:spPr/>
+        <p:txBody>
+          <a:bodyPr/>
+          <a:lstStyle/>
+          <a:p>
+            <a:pPr algn="l"/>
+            <a:r>
+              <a:rPr lang="cs-CZ" dirty="0" err="1"/>
+              <a:t>Layouts</a:t>
+            </a:r>
+            <a:r>
+              <a:rPr lang="cs-CZ" dirty="0"/>
+              <a:t> – jedna komponenta</a:t>
+            </a:r>
+            <a:endParaRPr lang="en-US" dirty="0"/>
+          </a:p>
+        </p:txBody>
+      </p:sp>
+      <p:sp>
+        <p:nvSpPr>
+          <p:cNvPr id="5" name="Zástupný symbol pro obsah 4">
+            <a:extLst>
+              <a:ext uri="{FF2B5EF4-FFF2-40B4-BE49-F238E27FC236}">
+                <a16:creationId xmlns:a16="http://schemas.microsoft.com/office/drawing/2014/main" id="{2F5839C5-C022-4648-AF6B-2261EDA6A76C}"/>
+              </a:ext>
+            </a:extLst>
+          </p:cNvPr>
+          <p:cNvSpPr>
+            <a:spLocks noGrp="1"/>
+          </p:cNvSpPr>
+          <p:nvPr>
+            <p:ph sz="half" idx="1"/>
+          </p:nvPr>
+        </p:nvSpPr>
+        <p:spPr>
+          <a:xfrm>
+            <a:off x="6172200" y="1600202"/>
+            <a:ext cx="4038600" cy="4525963"/>
+          </a:xfrm>
+        </p:spPr>
+        <p:txBody>
+          <a:bodyPr>
+            <a:normAutofit/>
+          </a:bodyPr>
+          <a:lstStyle/>
+          <a:p>
+            <a:r>
+              <a:rPr lang="en-US" b="1" dirty="0" err="1"/>
+              <a:t>ContentView</a:t>
+            </a:r>
+            <a:endParaRPr lang="en-US" b="1" dirty="0"/>
+          </a:p>
+          <a:p>
+            <a:pPr marL="0" indent="0" algn="ctr">
+              <a:buNone/>
+            </a:pPr>
+            <a:r>
+              <a:rPr lang="en-US" dirty="0" err="1"/>
+              <a:t>Jeden</a:t>
+            </a:r>
+            <a:r>
+              <a:rPr lang="en-US" dirty="0"/>
+              <a:t> </a:t>
+            </a:r>
+            <a:r>
+              <a:rPr lang="en-US" dirty="0" err="1"/>
+              <a:t>obsah</a:t>
+            </a:r>
+            <a:r>
+              <a:rPr lang="en-US" dirty="0"/>
+              <a:t>, b</a:t>
+            </a:r>
+            <a:r>
+              <a:rPr lang="cs-CZ" dirty="0" err="1"/>
+              <a:t>ázová</a:t>
+            </a:r>
+            <a:r>
+              <a:rPr lang="cs-CZ" dirty="0"/>
+              <a:t> třída</a:t>
+            </a:r>
+          </a:p>
+        </p:txBody>
+      </p:sp>
+      <p:sp>
+        <p:nvSpPr>
+          <p:cNvPr id="6" name="Zástupný symbol pro obsah 5">
+            <a:extLst>
+              <a:ext uri="{FF2B5EF4-FFF2-40B4-BE49-F238E27FC236}">
+                <a16:creationId xmlns:a16="http://schemas.microsoft.com/office/drawing/2014/main" id="{E32A623E-3F45-414D-8636-A4FF2E881A49}"/>
+              </a:ext>
+            </a:extLst>
+          </p:cNvPr>
+          <p:cNvSpPr>
+            <a:spLocks noGrp="1"/>
+          </p:cNvSpPr>
+          <p:nvPr>
+            <p:ph sz="half" idx="2"/>
+          </p:nvPr>
+        </p:nvSpPr>
+        <p:spPr>
+          <a:xfrm>
+            <a:off x="1981200" y="1600202"/>
+            <a:ext cx="4038600" cy="4525963"/>
+          </a:xfrm>
+        </p:spPr>
+        <p:txBody>
+          <a:bodyPr/>
+          <a:lstStyle/>
+          <a:p>
+            <a:r>
+              <a:rPr lang="cs-CZ" b="1" dirty="0" err="1"/>
+              <a:t>ContentPresenter</a:t>
+            </a:r>
+            <a:endParaRPr lang="cs-CZ" b="1" dirty="0"/>
+          </a:p>
+          <a:p>
+            <a:pPr marL="0" indent="0" algn="ctr">
+              <a:buNone/>
+            </a:pPr>
+            <a:r>
+              <a:rPr lang="en-US" dirty="0"/>
+              <a:t>M</a:t>
+            </a:r>
+            <a:r>
+              <a:rPr lang="cs-CZ" dirty="0" err="1"/>
+              <a:t>ísto</a:t>
+            </a:r>
+            <a:r>
+              <a:rPr lang="cs-CZ" dirty="0"/>
+              <a:t> pro obsah</a:t>
+            </a:r>
+            <a:r>
+              <a:rPr lang="en-US" dirty="0"/>
+              <a:t> - </a:t>
+            </a:r>
+            <a:r>
+              <a:rPr lang="cs-CZ" dirty="0"/>
+              <a:t>šablony</a:t>
+            </a:r>
+          </a:p>
+          <a:p>
+            <a:endParaRPr lang="en-US" dirty="0"/>
+          </a:p>
+        </p:txBody>
+      </p:sp>
+      <p:pic>
+        <p:nvPicPr>
+          <p:cNvPr id="7" name="Obrázek 6">
+            <a:extLst>
+              <a:ext uri="{FF2B5EF4-FFF2-40B4-BE49-F238E27FC236}">
+                <a16:creationId xmlns:a16="http://schemas.microsoft.com/office/drawing/2014/main" id="{BBD126C9-A16C-42F6-88D3-3BD9144CCDF4}"/>
+              </a:ext>
+            </a:extLst>
+          </p:cNvPr>
+          <p:cNvPicPr>
+            <a:picLocks noChangeAspect="1"/>
+          </p:cNvPicPr>
+          <p:nvPr/>
+        </p:nvPicPr>
+        <p:blipFill>
+          <a:blip r:embed="rId2"/>
+          <a:stretch>
+            <a:fillRect/>
+          </a:stretch>
+        </p:blipFill>
+        <p:spPr>
+          <a:xfrm>
+            <a:off x="3256456" y="2636912"/>
+            <a:ext cx="1503591" cy="3410205"/>
+          </a:xfrm>
+          <a:prstGeom prst="rect">
+            <a:avLst/>
+          </a:prstGeom>
+        </p:spPr>
+      </p:pic>
+      <p:pic>
+        <p:nvPicPr>
+          <p:cNvPr id="9" name="Obrázek 8">
+            <a:extLst>
+              <a:ext uri="{FF2B5EF4-FFF2-40B4-BE49-F238E27FC236}">
+                <a16:creationId xmlns:a16="http://schemas.microsoft.com/office/drawing/2014/main" id="{60A47F84-3A15-4087-8650-1DB164A91D4F}"/>
+              </a:ext>
+            </a:extLst>
+          </p:cNvPr>
+          <p:cNvPicPr>
+            <a:picLocks noChangeAspect="1"/>
+          </p:cNvPicPr>
+          <p:nvPr/>
+        </p:nvPicPr>
+        <p:blipFill>
+          <a:blip r:embed="rId3"/>
+          <a:stretch>
+            <a:fillRect/>
+          </a:stretch>
+        </p:blipFill>
+        <p:spPr>
+          <a:xfrm>
+            <a:off x="7414771" y="2638810"/>
+            <a:ext cx="1553458" cy="3487354"/>
+          </a:xfrm>
+          <a:prstGeom prst="rect">
+            <a:avLst/>
+          </a:prstGeom>
+        </p:spPr>
+      </p:pic>
+    </p:spTree>
+    <p:extLst>
+      <p:ext uri="{BB962C8B-B14F-4D97-AF65-F5344CB8AC3E}">
+        <p14:creationId xmlns:p14="http://schemas.microsoft.com/office/powerpoint/2010/main" val="1824929657"/>
+      </p:ext>
+    </p:extLst>
+  </p:cSld>
+  <p:clrMapOvr>
+    <a:masterClrMapping/>
+  </p:clrMapOvr>
+  <p:timing>
+    <p:tnLst>
+      <p:par>
+        <p:cTn id="1" dur="indefinite" restart="never" nodeType="tmRoot">
+          <p:childTnLst>
+            <p:seq concurrent="1" nextAc="seek">
+              <p:cTn id="2" dur="indefinite" nodeType="mainSeq">
+                <p:childTnLst>
+                  <p:par>
+                    <p:cTn id="3" fill="hold">
+                      <p:stCondLst>
+                        <p:cond delay="indefinite"/>
+                        <p:cond evt="onBegin" delay="0">
+                          <p:tn val="2"/>
+                        </p:cond>
+                      </p:stCondLst>
+                      <p:childTnLst>
+                        <p:par>
+                          <p:cTn id="4" fill="hold">
+                            <p:stCondLst>
+                              <p:cond delay="0"/>
+                            </p:stCondLst>
+                            <p:childTnLst>
+                              <p:par>
+                                <p:cTn id="5" presetID="1" presetClass="entr" presetSubtype="0" fill="hold" nodeType="withEffect">
+                                  <p:stCondLst>
+                                    <p:cond delay="0"/>
+                                  </p:stCondLst>
+                                  <p:childTnLst>
+                                    <p:set>
+                                      <p:cBhvr>
+                                        <p:cTn id="6" dur="1" fill="hold">
+                                          <p:stCondLst>
+                                            <p:cond delay="0"/>
+                                          </p:stCondLst>
+                                        </p:cTn>
+                                        <p:tgtEl>
+                                          <p:spTgt spid="7"/>
+                                        </p:tgtEl>
+                                        <p:attrNameLst>
+                                          <p:attrName>style.visibility</p:attrName>
+                                        </p:attrNameLst>
+                                      </p:cBhvr>
+                                      <p:to>
+                                        <p:strVal val="visible"/>
+                                      </p:to>
+                                    </p:set>
+                                  </p:childTnLst>
+                                </p:cTn>
+                              </p:par>
+                              <p:par>
+                                <p:cTn id="7" presetID="1" presetClass="entr" presetSubtype="0" fill="hold" grpId="0" nodeType="withEffect">
+                                  <p:stCondLst>
+                                    <p:cond delay="0"/>
+                                  </p:stCondLst>
+                                  <p:childTnLst>
+                                    <p:set>
+                                      <p:cBhvr>
+                                        <p:cTn id="8" dur="1" fill="hold">
+                                          <p:stCondLst>
+                                            <p:cond delay="0"/>
+                                          </p:stCondLst>
+                                        </p:cTn>
+                                        <p:tgtEl>
+                                          <p:spTgt spid="6">
+                                            <p:txEl>
+                                              <p:pRg st="0" end="0"/>
+                                            </p:txEl>
+                                          </p:spTgt>
+                                        </p:tgtEl>
+                                        <p:attrNameLst>
+                                          <p:attrName>style.visibility</p:attrName>
+                                        </p:attrNameLst>
+                                      </p:cBhvr>
+                                      <p:to>
+                                        <p:strVal val="visible"/>
+                                      </p:to>
+                                    </p:set>
+                                  </p:childTnLst>
+                                </p:cTn>
+                              </p:par>
+                              <p:par>
+                                <p:cTn id="9" presetID="1" presetClass="entr" presetSubtype="0" fill="hold" grpId="0" nodeType="withEffect">
+                                  <p:stCondLst>
+                                    <p:cond delay="0"/>
+                                  </p:stCondLst>
+                                  <p:childTnLst>
+                                    <p:set>
+                                      <p:cBhvr>
+                                        <p:cTn id="10" dur="1" fill="hold">
+                                          <p:stCondLst>
+                                            <p:cond delay="0"/>
+                                          </p:stCondLst>
+                                        </p:cTn>
+                                        <p:tgtEl>
+                                          <p:spTgt spid="6">
+                                            <p:txEl>
+                                              <p:pRg st="1" end="1"/>
+                                            </p:txEl>
+                                          </p:spTgt>
+                                        </p:tgtEl>
+                                        <p:attrNameLst>
+                                          <p:attrName>style.visibility</p:attrName>
+                                        </p:attrNameLst>
+                                      </p:cBhvr>
+                                      <p:to>
+                                        <p:strVal val="visible"/>
+                                      </p:to>
+                                    </p:set>
+                                  </p:childTnLst>
+                                </p:cTn>
+                              </p:par>
+                            </p:childTnLst>
+                          </p:cTn>
+                        </p:par>
+                      </p:childTnLst>
+                    </p:cTn>
+                  </p:par>
+                  <p:par>
+                    <p:cTn id="11" fill="hold">
+                      <p:stCondLst>
+                        <p:cond delay="indefinite"/>
+                      </p:stCondLst>
+                      <p:childTnLst>
+                        <p:par>
+                          <p:cTn id="12" fill="hold">
+                            <p:stCondLst>
+                              <p:cond delay="0"/>
+                            </p:stCondLst>
+                            <p:childTnLst>
+                              <p:par>
+                                <p:cTn id="13" presetID="1" presetClass="entr" presetSubtype="0" fill="hold" grpId="0" nodeType="clickEffect">
+                                  <p:stCondLst>
+                                    <p:cond delay="0"/>
+                                  </p:stCondLst>
+                                  <p:childTnLst>
+                                    <p:set>
+                                      <p:cBhvr>
+                                        <p:cTn id="14" dur="1" fill="hold">
+                                          <p:stCondLst>
+                                            <p:cond delay="0"/>
+                                          </p:stCondLst>
+                                        </p:cTn>
+                                        <p:tgtEl>
+                                          <p:spTgt spid="5">
+                                            <p:txEl>
+                                              <p:pRg st="0" end="0"/>
+                                            </p:txEl>
+                                          </p:spTgt>
+                                        </p:tgtEl>
+                                        <p:attrNameLst>
+                                          <p:attrName>style.visibility</p:attrName>
+                                        </p:attrNameLst>
+                                      </p:cBhvr>
+                                      <p:to>
+                                        <p:strVal val="visible"/>
+                                      </p:to>
+                                    </p:set>
+                                  </p:childTnLst>
+                                </p:cTn>
+                              </p:par>
+                              <p:par>
+                                <p:cTn id="15" presetID="1" presetClass="entr" presetSubtype="0" fill="hold" grpId="0" nodeType="withEffect">
+                                  <p:stCondLst>
+                                    <p:cond delay="0"/>
+                                  </p:stCondLst>
+                                  <p:childTnLst>
+                                    <p:set>
+                                      <p:cBhvr>
+                                        <p:cTn id="16" dur="1" fill="hold">
+                                          <p:stCondLst>
+                                            <p:cond delay="0"/>
+                                          </p:stCondLst>
+                                        </p:cTn>
+                                        <p:tgtEl>
+                                          <p:spTgt spid="5">
+                                            <p:txEl>
+                                              <p:pRg st="1" end="1"/>
+                                            </p:txEl>
+                                          </p:spTgt>
+                                        </p:tgtEl>
+                                        <p:attrNameLst>
+                                          <p:attrName>style.visibility</p:attrName>
+                                        </p:attrNameLst>
+                                      </p:cBhvr>
+                                      <p:to>
+                                        <p:strVal val="visible"/>
+                                      </p:to>
+                                    </p:set>
+                                  </p:childTnLst>
+                                </p:cTn>
+                              </p:par>
+                              <p:par>
+                                <p:cTn id="17" presetID="1" presetClass="entr" presetSubtype="0" fill="hold" nodeType="withEffect">
+                                  <p:stCondLst>
+                                    <p:cond delay="0"/>
+                                  </p:stCondLst>
+                                  <p:childTnLst>
+                                    <p:set>
+                                      <p:cBhvr>
+                                        <p:cTn id="18" dur="1" fill="hold">
+                                          <p:stCondLst>
+                                            <p:cond delay="0"/>
+                                          </p:stCondLst>
+                                        </p:cTn>
+                                        <p:tgtEl>
+                                          <p:spTgt spid="9"/>
+                                        </p:tgtEl>
+                                        <p:attrNameLst>
+                                          <p:attrName>style.visibility</p:attrName>
+                                        </p:attrNameLst>
+                                      </p:cBhvr>
+                                      <p:to>
+                                        <p:strVal val="visible"/>
+                                      </p:to>
+                                    </p:set>
+                                  </p:childTnLst>
+                                </p:cTn>
+                              </p:par>
+                            </p:childTnLst>
+                          </p:cTn>
+                        </p:par>
+                      </p:childTnLst>
+                    </p:cTn>
+                  </p:par>
+                </p:childTnLst>
+              </p:cTn>
+              <p:prevCondLst>
+                <p:cond evt="onPrev" delay="0">
+                  <p:tgtEl>
+                    <p:sldTgt/>
+                  </p:tgtEl>
+                </p:cond>
+              </p:prevCondLst>
+              <p:nextCondLst>
+                <p:cond evt="onNext" delay="0">
+                  <p:tgtEl>
+                    <p:sldTgt/>
+                  </p:tgtEl>
+                </p:cond>
+              </p:nextCondLst>
+            </p:seq>
+          </p:childTnLst>
+        </p:cTn>
+      </p:par>
+    </p:tnLst>
+    <p:bldLst>
+      <p:bldP spid="5" grpId="0" uiExpand="1" build="p"/>
+      <p:bldP spid="6" grpId="0" uiExpand="1" build="p"/>
     </p:bldLst>
   </p:timing>
 </p:sld>

</xml_diff>